<commit_message>
Se han actualizado el doc de arquitectura y la presentacion
</commit_message>
<xml_diff>
--- a/doc/Presentacion.pptx
+++ b/doc/Presentacion.pptx
@@ -17,6 +17,7 @@
     <p:sldId id="264" r:id="rId11"/>
     <p:sldId id="267" r:id="rId12"/>
     <p:sldId id="265" r:id="rId13"/>
+    <p:sldId id="268" r:id="rId14"/>
   </p:sldIdLst>
   <p:sldSz cx="9144000" cy="6858000" type="screen4x3"/>
   <p:notesSz cx="6858000" cy="9144000"/>
@@ -3705,13 +3706,90 @@
           <a:lstStyle/>
           <a:p>
             <a:r>
-              <a:rPr lang="es-AR" dirty="0" smtClean="0"/>
-              <a:t>Bugs conocidos sin reparar</a:t>
+              <a:rPr lang="es-AR" dirty="0"/>
+              <a:t>Test unitarios y de sistema</a:t>
             </a:r>
             <a:endParaRPr lang="es-ES" dirty="0"/>
           </a:p>
-        </p:txBody>
-      </p:sp>
+          <a:p>
+            <a:pPr marL="64008" indent="0">
+              <a:buNone/>
+            </a:pPr>
+            <a:endParaRPr lang="es-AR" dirty="0"/>
+          </a:p>
+          <a:p>
+            <a:pPr>
+              <a:buFont typeface="Wingdings" pitchFamily="2" charset="2"/>
+              <a:buChar char="Ø"/>
+            </a:pPr>
+            <a:endParaRPr lang="es-ES" dirty="0"/>
+          </a:p>
+        </p:txBody>
+      </p:sp>
+      <p:pic>
+        <p:nvPicPr>
+          <p:cNvPr id="4" name="Picture 2"/>
+          <p:cNvPicPr>
+            <a:picLocks noChangeAspect="1" noChangeArrowheads="1"/>
+          </p:cNvPicPr>
+          <p:nvPr/>
+        </p:nvPicPr>
+        <p:blipFill>
+          <a:blip r:embed="rId2">
+            <a:extLst>
+              <a:ext uri="{28A0092B-C50C-407E-A947-70E740481C1C}">
+                <a14:useLocalDpi xmlns:a14="http://schemas.microsoft.com/office/drawing/2010/main" val="0"/>
+              </a:ext>
+            </a:extLst>
+          </a:blip>
+          <a:srcRect/>
+          <a:stretch>
+            <a:fillRect/>
+          </a:stretch>
+        </p:blipFill>
+        <p:spPr bwMode="auto">
+          <a:xfrm>
+            <a:off x="2843808" y="2852936"/>
+            <a:ext cx="3240360" cy="3456384"/>
+          </a:xfrm>
+          <a:prstGeom prst="rect">
+            <a:avLst/>
+          </a:prstGeom>
+          <a:noFill/>
+          <a:ln>
+            <a:noFill/>
+          </a:ln>
+          <a:effectLst/>
+          <a:extLst>
+            <a:ext uri="{909E8E84-426E-40DD-AFC4-6F175D3DCCD1}">
+              <a14:hiddenFill xmlns:a14="http://schemas.microsoft.com/office/drawing/2010/main">
+                <a:solidFill>
+                  <a:schemeClr val="accent1"/>
+                </a:solidFill>
+              </a14:hiddenFill>
+            </a:ext>
+            <a:ext uri="{91240B29-F687-4F45-9708-019B960494DF}">
+              <a14:hiddenLine xmlns:a14="http://schemas.microsoft.com/office/drawing/2010/main" w="9525">
+                <a:solidFill>
+                  <a:schemeClr val="tx1"/>
+                </a:solidFill>
+                <a:miter lim="800000"/>
+                <a:headEnd/>
+                <a:tailEnd/>
+              </a14:hiddenLine>
+            </a:ext>
+            <a:ext uri="{AF507438-7753-43E0-B8FC-AC1667EBCBE1}">
+              <a14:hiddenEffects xmlns:a14="http://schemas.microsoft.com/office/drawing/2010/main">
+                <a:effectLst>
+                  <a:outerShdw dist="35921" dir="2700000" algn="ctr" rotWithShape="0">
+                    <a:schemeClr val="bg2"/>
+                  </a:outerShdw>
+                </a:effectLst>
+              </a14:hiddenEffects>
+            </a:ext>
+          </a:extLst>
+        </p:spPr>
+      </p:pic>
     </p:spTree>
     <p:extLst>
       <p:ext uri="{BB962C8B-B14F-4D97-AF65-F5344CB8AC3E}">
@@ -3782,16 +3860,76 @@
           <a:p>
             <a:r>
               <a:rPr lang="es-AR" dirty="0" smtClean="0"/>
-              <a:t>Test unitarios y </a:t>
-            </a:r>
-            <a:r>
-              <a:rPr lang="es-AR" smtClean="0"/>
-              <a:t>de sistema</a:t>
+              <a:t>Casos de prueba y prueba de sistema</a:t>
             </a:r>
             <a:endParaRPr lang="es-ES" dirty="0"/>
           </a:p>
         </p:txBody>
       </p:sp>
+      <p:pic>
+        <p:nvPicPr>
+          <p:cNvPr id="1027" name="Picture 3"/>
+          <p:cNvPicPr>
+            <a:picLocks noChangeAspect="1" noChangeArrowheads="1"/>
+          </p:cNvPicPr>
+          <p:nvPr/>
+        </p:nvPicPr>
+        <p:blipFill>
+          <a:blip r:embed="rId2">
+            <a:extLst>
+              <a:ext uri="{28A0092B-C50C-407E-A947-70E740481C1C}">
+                <a14:useLocalDpi xmlns:a14="http://schemas.microsoft.com/office/drawing/2010/main" val="0"/>
+              </a:ext>
+            </a:extLst>
+          </a:blip>
+          <a:srcRect/>
+          <a:stretch>
+            <a:fillRect/>
+          </a:stretch>
+        </p:blipFill>
+        <p:spPr bwMode="auto">
+          <a:xfrm>
+            <a:off x="1979712" y="2708920"/>
+            <a:ext cx="5222672" cy="3967138"/>
+          </a:xfrm>
+          <a:prstGeom prst="rect">
+            <a:avLst/>
+          </a:prstGeom>
+          <a:noFill/>
+          <a:ln>
+            <a:noFill/>
+          </a:ln>
+          <a:effectLst/>
+          <a:extLst>
+            <a:ext uri="{909E8E84-426E-40DD-AFC4-6F175D3DCCD1}">
+              <a14:hiddenFill xmlns:a14="http://schemas.microsoft.com/office/drawing/2010/main">
+                <a:solidFill>
+                  <a:schemeClr val="accent1"/>
+                </a:solidFill>
+              </a14:hiddenFill>
+            </a:ext>
+            <a:ext uri="{91240B29-F687-4F45-9708-019B960494DF}">
+              <a14:hiddenLine xmlns:a14="http://schemas.microsoft.com/office/drawing/2010/main" w="9525">
+                <a:solidFill>
+                  <a:schemeClr val="tx1"/>
+                </a:solidFill>
+                <a:miter lim="800000"/>
+                <a:headEnd/>
+                <a:tailEnd/>
+              </a14:hiddenLine>
+            </a:ext>
+            <a:ext uri="{AF507438-7753-43E0-B8FC-AC1667EBCBE1}">
+              <a14:hiddenEffects xmlns:a14="http://schemas.microsoft.com/office/drawing/2010/main">
+                <a:effectLst>
+                  <a:outerShdw dist="35921" dir="2700000" algn="ctr" rotWithShape="0">
+                    <a:schemeClr val="bg2"/>
+                  </a:outerShdw>
+                </a:effectLst>
+              </a14:hiddenEffects>
+            </a:ext>
+          </a:extLst>
+        </p:spPr>
+      </p:pic>
     </p:spTree>
     <p:extLst>
       <p:ext uri="{BB962C8B-B14F-4D97-AF65-F5344CB8AC3E}">
@@ -3855,39 +3993,230 @@
             <p:ph idx="1"/>
           </p:nvPr>
         </p:nvSpPr>
-        <p:spPr/>
-        <p:txBody>
-          <a:bodyPr/>
+        <p:spPr>
+          <a:xfrm>
+            <a:off x="3419872" y="4437112"/>
+            <a:ext cx="288032" cy="577536"/>
+          </a:xfrm>
+        </p:spPr>
+        <p:txBody>
+          <a:bodyPr>
+            <a:noAutofit/>
+          </a:bodyPr>
           <a:lstStyle/>
           <a:p>
-            <a:r>
-              <a:rPr lang="es-AR" dirty="0" smtClean="0"/>
-              <a:t>Resultados de </a:t>
-            </a:r>
-            <a:r>
-              <a:rPr lang="es-AR" dirty="0" err="1" smtClean="0"/>
-              <a:t>pass</a:t>
-            </a:r>
-            <a:r>
-              <a:rPr lang="es-AR" dirty="0" smtClean="0"/>
-              <a:t>/</a:t>
-            </a:r>
-            <a:r>
-              <a:rPr lang="es-AR" dirty="0" err="1" smtClean="0"/>
-              <a:t>fail</a:t>
-            </a:r>
-            <a:r>
-              <a:rPr lang="es-AR" dirty="0" smtClean="0"/>
-              <a:t> test</a:t>
-            </a:r>
-            <a:endParaRPr lang="es-ES" dirty="0"/>
-          </a:p>
-        </p:txBody>
-      </p:sp>
+            <a:pPr marL="64008" indent="0">
+              <a:buNone/>
+            </a:pPr>
+            <a:endParaRPr lang="es-ES" sz="800" dirty="0"/>
+          </a:p>
+        </p:txBody>
+      </p:sp>
+      <p:pic>
+        <p:nvPicPr>
+          <p:cNvPr id="2050" name="Picture 2"/>
+          <p:cNvPicPr>
+            <a:picLocks noChangeAspect="1" noChangeArrowheads="1"/>
+          </p:cNvPicPr>
+          <p:nvPr/>
+        </p:nvPicPr>
+        <p:blipFill>
+          <a:blip r:embed="rId2">
+            <a:extLst>
+              <a:ext uri="{28A0092B-C50C-407E-A947-70E740481C1C}">
+                <a14:useLocalDpi xmlns:a14="http://schemas.microsoft.com/office/drawing/2010/main" val="0"/>
+              </a:ext>
+            </a:extLst>
+          </a:blip>
+          <a:srcRect/>
+          <a:stretch>
+            <a:fillRect/>
+          </a:stretch>
+        </p:blipFill>
+        <p:spPr bwMode="auto">
+          <a:xfrm>
+            <a:off x="1835696" y="1700808"/>
+            <a:ext cx="5277197" cy="4900323"/>
+          </a:xfrm>
+          <a:prstGeom prst="rect">
+            <a:avLst/>
+          </a:prstGeom>
+          <a:noFill/>
+          <a:ln>
+            <a:noFill/>
+          </a:ln>
+          <a:effectLst/>
+          <a:extLst>
+            <a:ext uri="{909E8E84-426E-40DD-AFC4-6F175D3DCCD1}">
+              <a14:hiddenFill xmlns:a14="http://schemas.microsoft.com/office/drawing/2010/main">
+                <a:solidFill>
+                  <a:schemeClr val="accent1"/>
+                </a:solidFill>
+              </a14:hiddenFill>
+            </a:ext>
+            <a:ext uri="{91240B29-F687-4F45-9708-019B960494DF}">
+              <a14:hiddenLine xmlns:a14="http://schemas.microsoft.com/office/drawing/2010/main" w="9525">
+                <a:solidFill>
+                  <a:schemeClr val="tx1"/>
+                </a:solidFill>
+                <a:miter lim="800000"/>
+                <a:headEnd/>
+                <a:tailEnd/>
+              </a14:hiddenLine>
+            </a:ext>
+            <a:ext uri="{AF507438-7753-43E0-B8FC-AC1667EBCBE1}">
+              <a14:hiddenEffects xmlns:a14="http://schemas.microsoft.com/office/drawing/2010/main">
+                <a:effectLst>
+                  <a:outerShdw dist="35921" dir="2700000" algn="ctr" rotWithShape="0">
+                    <a:schemeClr val="bg2"/>
+                  </a:outerShdw>
+                </a:effectLst>
+              </a14:hiddenEffects>
+            </a:ext>
+          </a:extLst>
+        </p:spPr>
+      </p:pic>
     </p:spTree>
     <p:extLst>
       <p:ext uri="{BB962C8B-B14F-4D97-AF65-F5344CB8AC3E}">
         <p14:creationId xmlns:p14="http://schemas.microsoft.com/office/powerpoint/2010/main" val="1786157773"/>
+      </p:ext>
+    </p:extLst>
+  </p:cSld>
+  <p:clrMapOvr>
+    <a:masterClrMapping/>
+  </p:clrMapOvr>
+</p:sld>
+</file>
+
+<file path=ppt/slides/slide13.xml><?xml version="1.0" encoding="utf-8"?>
+<p:sld xmlns:a="http://schemas.openxmlformats.org/drawingml/2006/main" xmlns:r="http://schemas.openxmlformats.org/officeDocument/2006/relationships" xmlns:p="http://schemas.openxmlformats.org/presentationml/2006/main">
+  <p:cSld>
+    <p:spTree>
+      <p:nvGrpSpPr>
+        <p:cNvPr id="1" name=""/>
+        <p:cNvGrpSpPr/>
+        <p:nvPr/>
+      </p:nvGrpSpPr>
+      <p:grpSpPr>
+        <a:xfrm>
+          <a:off x="0" y="0"/>
+          <a:ext cx="0" cy="0"/>
+          <a:chOff x="0" y="0"/>
+          <a:chExt cx="0" cy="0"/>
+        </a:xfrm>
+      </p:grpSpPr>
+      <p:sp>
+        <p:nvSpPr>
+          <p:cNvPr id="2" name="1 Título"/>
+          <p:cNvSpPr>
+            <a:spLocks noGrp="1"/>
+          </p:cNvSpPr>
+          <p:nvPr>
+            <p:ph type="title"/>
+          </p:nvPr>
+        </p:nvSpPr>
+        <p:spPr/>
+        <p:txBody>
+          <a:bodyPr/>
+          <a:lstStyle/>
+          <a:p>
+            <a:r>
+              <a:rPr lang="es-ES" dirty="0" smtClean="0"/>
+              <a:t>Pruebas de software</a:t>
+            </a:r>
+            <a:endParaRPr lang="es-ES" dirty="0"/>
+          </a:p>
+        </p:txBody>
+      </p:sp>
+      <p:sp>
+        <p:nvSpPr>
+          <p:cNvPr id="3" name="2 Marcador de contenido"/>
+          <p:cNvSpPr>
+            <a:spLocks noGrp="1"/>
+          </p:cNvSpPr>
+          <p:nvPr>
+            <p:ph idx="1"/>
+          </p:nvPr>
+        </p:nvSpPr>
+        <p:spPr/>
+        <p:txBody>
+          <a:bodyPr/>
+          <a:lstStyle/>
+          <a:p>
+            <a:r>
+              <a:rPr lang="es-ES" dirty="0" smtClean="0"/>
+              <a:t>Porcentaje de </a:t>
+            </a:r>
+            <a:r>
+              <a:rPr lang="es-ES" dirty="0" err="1" smtClean="0"/>
+              <a:t>pass</a:t>
+            </a:r>
+            <a:r>
+              <a:rPr lang="es-ES" dirty="0" smtClean="0"/>
+              <a:t>/</a:t>
+            </a:r>
+            <a:r>
+              <a:rPr lang="es-ES" dirty="0" err="1" smtClean="0"/>
+              <a:t>fail</a:t>
+            </a:r>
+            <a:r>
+              <a:rPr lang="es-ES" dirty="0" smtClean="0"/>
+              <a:t> ratio:</a:t>
+            </a:r>
+          </a:p>
+          <a:p>
+            <a:endParaRPr lang="es-ES" dirty="0"/>
+          </a:p>
+          <a:p>
+            <a:pPr marL="64008" indent="0" algn="ctr">
+              <a:buNone/>
+            </a:pPr>
+            <a:r>
+              <a:rPr lang="es-ES" dirty="0" smtClean="0"/>
+              <a:t>Pruebas Unitarias y de Integración</a:t>
+            </a:r>
+          </a:p>
+          <a:p>
+            <a:pPr marL="64008" indent="0" algn="ctr">
+              <a:buNone/>
+            </a:pPr>
+            <a:r>
+              <a:rPr lang="es-ES" dirty="0" smtClean="0"/>
+              <a:t>100%</a:t>
+            </a:r>
+          </a:p>
+          <a:p>
+            <a:pPr marL="64008" indent="0" algn="ctr">
+              <a:buNone/>
+            </a:pPr>
+            <a:endParaRPr lang="es-ES" dirty="0"/>
+          </a:p>
+          <a:p>
+            <a:pPr marL="64008" indent="0" algn="ctr">
+              <a:buNone/>
+            </a:pPr>
+            <a:r>
+              <a:rPr lang="es-ES" dirty="0" smtClean="0"/>
+              <a:t>Pruebas de sistema</a:t>
+            </a:r>
+          </a:p>
+          <a:p>
+            <a:pPr marL="64008" indent="0" algn="ctr">
+              <a:buNone/>
+            </a:pPr>
+            <a:r>
+              <a:rPr lang="es-ES" dirty="0" smtClean="0"/>
+              <a:t>87%</a:t>
+            </a:r>
+            <a:endParaRPr lang="es-ES" dirty="0"/>
+          </a:p>
+        </p:txBody>
+      </p:sp>
+    </p:spTree>
+    <p:extLst>
+      <p:ext uri="{BB962C8B-B14F-4D97-AF65-F5344CB8AC3E}">
+        <p14:creationId xmlns:p14="http://schemas.microsoft.com/office/powerpoint/2010/main" val="2851059683"/>
       </p:ext>
     </p:extLst>
   </p:cSld>
@@ -4331,20 +4660,20 @@
               <a:t>Se utilizo un </a:t>
             </a:r>
             <a:r>
-              <a:rPr lang="es-AR" dirty="0" err="1" smtClean="0"/>
-              <a:t>patron</a:t>
-            </a:r>
-            <a:r>
               <a:rPr lang="es-AR" dirty="0" smtClean="0"/>
-              <a:t> de arquitectura MVC para el </a:t>
-            </a:r>
-            <a:r>
-              <a:rPr lang="es-AR" dirty="0" err="1" smtClean="0"/>
-              <a:t>dieño</a:t>
+              <a:t>patrón </a:t>
             </a:r>
             <a:r>
               <a:rPr lang="es-AR" dirty="0" smtClean="0"/>
-              <a:t> del sistema</a:t>
+              <a:t>de arquitectura MVC para el </a:t>
+            </a:r>
+            <a:r>
+              <a:rPr lang="es-AR" dirty="0" smtClean="0"/>
+              <a:t>diseño </a:t>
+            </a:r>
+            <a:r>
+              <a:rPr lang="es-AR" dirty="0" smtClean="0"/>
+              <a:t>del sistema</a:t>
             </a:r>
           </a:p>
           <a:p>
@@ -5538,12 +5867,12 @@
               <a:t>Diagrama de despliegue : </a:t>
             </a:r>
             <a:r>
-              <a:rPr lang="es-AR" dirty="0" err="1" smtClean="0"/>
-              <a:t>implementacion</a:t>
-            </a:r>
-            <a:r>
               <a:rPr lang="es-AR" dirty="0" smtClean="0"/>
-              <a:t> ideal del sistema</a:t>
+              <a:t>implementación </a:t>
+            </a:r>
+            <a:r>
+              <a:rPr lang="es-AR" dirty="0" smtClean="0"/>
+              <a:t>ideal del sistema</a:t>
             </a:r>
             <a:endParaRPr lang="es-ES" dirty="0"/>
           </a:p>
@@ -5666,6 +5995,39 @@
           </a:p>
         </p:txBody>
       </p:sp>
+      <p:pic>
+        <p:nvPicPr>
+          <p:cNvPr id="4" name="3 Imagen"/>
+          <p:cNvPicPr/>
+          <p:nvPr/>
+        </p:nvPicPr>
+        <p:blipFill>
+          <a:blip r:embed="rId2">
+            <a:extLst>
+              <a:ext uri="{28A0092B-C50C-407E-A947-70E740481C1C}">
+                <a14:useLocalDpi xmlns:a14="http://schemas.microsoft.com/office/drawing/2010/main" val="0"/>
+              </a:ext>
+            </a:extLst>
+          </a:blip>
+          <a:srcRect/>
+          <a:stretch>
+            <a:fillRect/>
+          </a:stretch>
+        </p:blipFill>
+        <p:spPr bwMode="auto">
+          <a:xfrm>
+            <a:off x="1475656" y="2564904"/>
+            <a:ext cx="6048672" cy="3672408"/>
+          </a:xfrm>
+          <a:prstGeom prst="rect">
+            <a:avLst/>
+          </a:prstGeom>
+          <a:noFill/>
+          <a:ln>
+            <a:noFill/>
+          </a:ln>
+        </p:spPr>
+      </p:pic>
     </p:spTree>
     <p:extLst>
       <p:ext uri="{BB962C8B-B14F-4D97-AF65-F5344CB8AC3E}">
@@ -5744,20 +6106,8 @@
               <a:t>Diagrama de componentes: </a:t>
             </a:r>
             <a:r>
-              <a:rPr lang="es-AR" dirty="0" err="1" smtClean="0"/>
-              <a:t>modulos</a:t>
-            </a:r>
-            <a:r>
               <a:rPr lang="es-AR" dirty="0" smtClean="0"/>
-              <a:t> </a:t>
-            </a:r>
-            <a:r>
-              <a:rPr lang="es-AR" dirty="0" err="1" smtClean="0"/>
-              <a:t>indentificados</a:t>
-            </a:r>
-            <a:r>
-              <a:rPr lang="es-AR" dirty="0" smtClean="0"/>
-              <a:t> </a:t>
+              <a:t>módulos identificados </a:t>
             </a:r>
             <a:endParaRPr lang="es-ES" dirty="0"/>
           </a:p>

</xml_diff>

<commit_message>
Se actualiza la presentacion y la nota de entrega
</commit_message>
<xml_diff>
--- a/doc/Presentacion.pptx
+++ b/doc/Presentacion.pptx
@@ -7,17 +7,20 @@
   <p:sldIdLst>
     <p:sldId id="256" r:id="rId2"/>
     <p:sldId id="262" r:id="rId3"/>
-    <p:sldId id="263" r:id="rId4"/>
-    <p:sldId id="257" r:id="rId5"/>
-    <p:sldId id="259" r:id="rId6"/>
-    <p:sldId id="258" r:id="rId7"/>
-    <p:sldId id="260" r:id="rId8"/>
-    <p:sldId id="266" r:id="rId9"/>
-    <p:sldId id="261" r:id="rId10"/>
-    <p:sldId id="264" r:id="rId11"/>
-    <p:sldId id="267" r:id="rId12"/>
-    <p:sldId id="265" r:id="rId13"/>
-    <p:sldId id="268" r:id="rId14"/>
+    <p:sldId id="269" r:id="rId4"/>
+    <p:sldId id="263" r:id="rId5"/>
+    <p:sldId id="257" r:id="rId6"/>
+    <p:sldId id="259" r:id="rId7"/>
+    <p:sldId id="258" r:id="rId8"/>
+    <p:sldId id="260" r:id="rId9"/>
+    <p:sldId id="266" r:id="rId10"/>
+    <p:sldId id="261" r:id="rId11"/>
+    <p:sldId id="270" r:id="rId12"/>
+    <p:sldId id="271" r:id="rId13"/>
+    <p:sldId id="264" r:id="rId14"/>
+    <p:sldId id="267" r:id="rId15"/>
+    <p:sldId id="265" r:id="rId16"/>
+    <p:sldId id="268" r:id="rId17"/>
   </p:sldIdLst>
   <p:sldSz cx="9144000" cy="6858000" type="screen4x3"/>
   <p:notesSz cx="6858000" cy="9144000"/>
@@ -3587,7 +3590,11 @@
           <a:p>
             <a:r>
               <a:rPr lang="es-AR" dirty="0" smtClean="0"/>
-              <a:t>Modelo de aplicación de venta de indumentaria deportiva online</a:t>
+              <a:t>Modelo de aplicación de venta de indumentaria deportiva </a:t>
+            </a:r>
+            <a:r>
+              <a:rPr lang="es-AR" dirty="0" smtClean="0"/>
+              <a:t>online DXMARKET</a:t>
             </a:r>
             <a:endParaRPr lang="es-ES" dirty="0"/>
           </a:p>
@@ -3647,6 +3654,577 @@
 </file>
 
 <file path=ppt/slides/slide10.xml><?xml version="1.0" encoding="utf-8"?>
+<p:sld xmlns:a="http://schemas.openxmlformats.org/drawingml/2006/main" xmlns:r="http://schemas.openxmlformats.org/officeDocument/2006/relationships" xmlns:p="http://schemas.openxmlformats.org/presentationml/2006/main">
+  <p:cSld>
+    <p:spTree>
+      <p:nvGrpSpPr>
+        <p:cNvPr id="1" name=""/>
+        <p:cNvGrpSpPr/>
+        <p:nvPr/>
+      </p:nvGrpSpPr>
+      <p:grpSpPr>
+        <a:xfrm>
+          <a:off x="0" y="0"/>
+          <a:ext cx="0" cy="0"/>
+          <a:chOff x="0" y="0"/>
+          <a:chExt cx="0" cy="0"/>
+        </a:xfrm>
+      </p:grpSpPr>
+      <p:sp>
+        <p:nvSpPr>
+          <p:cNvPr id="2" name="1 Título"/>
+          <p:cNvSpPr>
+            <a:spLocks noGrp="1"/>
+          </p:cNvSpPr>
+          <p:nvPr>
+            <p:ph type="title"/>
+          </p:nvPr>
+        </p:nvSpPr>
+        <p:spPr/>
+        <p:txBody>
+          <a:bodyPr/>
+          <a:lstStyle/>
+          <a:p>
+            <a:r>
+              <a:rPr lang="es-AR" dirty="0" smtClean="0"/>
+              <a:t>Diseño</a:t>
+            </a:r>
+            <a:endParaRPr lang="es-ES" dirty="0"/>
+          </a:p>
+        </p:txBody>
+      </p:sp>
+      <p:sp>
+        <p:nvSpPr>
+          <p:cNvPr id="3" name="2 Marcador de contenido"/>
+          <p:cNvSpPr>
+            <a:spLocks noGrp="1"/>
+          </p:cNvSpPr>
+          <p:nvPr>
+            <p:ph idx="1"/>
+          </p:nvPr>
+        </p:nvSpPr>
+        <p:spPr>
+          <a:xfrm>
+            <a:off x="467544" y="1412776"/>
+            <a:ext cx="8229600" cy="5256584"/>
+          </a:xfrm>
+        </p:spPr>
+        <p:txBody>
+          <a:bodyPr/>
+          <a:lstStyle/>
+          <a:p>
+            <a:r>
+              <a:rPr lang="es-AR" dirty="0" smtClean="0"/>
+              <a:t>Diagrama de componentes: módulos identificados </a:t>
+            </a:r>
+            <a:endParaRPr lang="es-ES" dirty="0"/>
+          </a:p>
+        </p:txBody>
+      </p:sp>
+      <p:pic>
+        <p:nvPicPr>
+          <p:cNvPr id="4098" name="Picture 2" descr="C:\Users\Usuario\Downloads\diagrama componentes.JPG"/>
+          <p:cNvPicPr>
+            <a:picLocks noChangeAspect="1" noChangeArrowheads="1"/>
+          </p:cNvPicPr>
+          <p:nvPr/>
+        </p:nvPicPr>
+        <p:blipFill>
+          <a:blip r:embed="rId2">
+            <a:extLst>
+              <a:ext uri="{28A0092B-C50C-407E-A947-70E740481C1C}">
+                <a14:useLocalDpi xmlns:a14="http://schemas.microsoft.com/office/drawing/2010/main" val="0"/>
+              </a:ext>
+            </a:extLst>
+          </a:blip>
+          <a:srcRect/>
+          <a:stretch>
+            <a:fillRect/>
+          </a:stretch>
+        </p:blipFill>
+        <p:spPr bwMode="auto">
+          <a:xfrm>
+            <a:off x="683568" y="2636912"/>
+            <a:ext cx="7920880" cy="3888432"/>
+          </a:xfrm>
+          <a:prstGeom prst="rect">
+            <a:avLst/>
+          </a:prstGeom>
+          <a:noFill/>
+          <a:extLst>
+            <a:ext uri="{909E8E84-426E-40DD-AFC4-6F175D3DCCD1}">
+              <a14:hiddenFill xmlns:a14="http://schemas.microsoft.com/office/drawing/2010/main">
+                <a:solidFill>
+                  <a:srgbClr val="FFFFFF"/>
+                </a:solidFill>
+              </a14:hiddenFill>
+            </a:ext>
+          </a:extLst>
+        </p:spPr>
+      </p:pic>
+    </p:spTree>
+    <p:extLst>
+      <p:ext uri="{BB962C8B-B14F-4D97-AF65-F5344CB8AC3E}">
+        <p14:creationId xmlns:p14="http://schemas.microsoft.com/office/powerpoint/2010/main" val="3508255810"/>
+      </p:ext>
+    </p:extLst>
+  </p:cSld>
+  <p:clrMapOvr>
+    <a:masterClrMapping/>
+  </p:clrMapOvr>
+</p:sld>
+</file>
+
+<file path=ppt/slides/slide11.xml><?xml version="1.0" encoding="utf-8"?>
+<p:sld xmlns:a="http://schemas.openxmlformats.org/drawingml/2006/main" xmlns:r="http://schemas.openxmlformats.org/officeDocument/2006/relationships" xmlns:p="http://schemas.openxmlformats.org/presentationml/2006/main">
+  <p:cSld>
+    <p:spTree>
+      <p:nvGrpSpPr>
+        <p:cNvPr id="1" name=""/>
+        <p:cNvGrpSpPr/>
+        <p:nvPr/>
+      </p:nvGrpSpPr>
+      <p:grpSpPr>
+        <a:xfrm>
+          <a:off x="0" y="0"/>
+          <a:ext cx="0" cy="0"/>
+          <a:chOff x="0" y="0"/>
+          <a:chExt cx="0" cy="0"/>
+        </a:xfrm>
+      </p:grpSpPr>
+      <p:sp>
+        <p:nvSpPr>
+          <p:cNvPr id="2" name="1 Título"/>
+          <p:cNvSpPr>
+            <a:spLocks noGrp="1"/>
+          </p:cNvSpPr>
+          <p:nvPr>
+            <p:ph type="title"/>
+          </p:nvPr>
+        </p:nvSpPr>
+        <p:spPr/>
+        <p:txBody>
+          <a:bodyPr/>
+          <a:lstStyle/>
+          <a:p>
+            <a:r>
+              <a:rPr lang="es-ES" dirty="0" smtClean="0"/>
+              <a:t>Patrones de Diseño</a:t>
+            </a:r>
+            <a:endParaRPr lang="es-ES" dirty="0"/>
+          </a:p>
+        </p:txBody>
+      </p:sp>
+      <p:sp>
+        <p:nvSpPr>
+          <p:cNvPr id="3" name="2 Marcador de contenido"/>
+          <p:cNvSpPr>
+            <a:spLocks noGrp="1"/>
+          </p:cNvSpPr>
+          <p:nvPr>
+            <p:ph idx="1"/>
+          </p:nvPr>
+        </p:nvSpPr>
+        <p:spPr/>
+        <p:txBody>
+          <a:bodyPr/>
+          <a:lstStyle/>
+          <a:p>
+            <a:r>
+              <a:rPr lang="es-ES" dirty="0" smtClean="0"/>
+              <a:t>Patrón </a:t>
+            </a:r>
+            <a:r>
+              <a:rPr lang="es-ES" dirty="0" err="1" smtClean="0"/>
+              <a:t>Observer</a:t>
+            </a:r>
+            <a:r>
+              <a:rPr lang="es-ES" dirty="0" smtClean="0"/>
+              <a:t>:</a:t>
+            </a:r>
+          </a:p>
+          <a:p>
+            <a:endParaRPr lang="es-ES" dirty="0"/>
+          </a:p>
+        </p:txBody>
+      </p:sp>
+      <p:pic>
+        <p:nvPicPr>
+          <p:cNvPr id="4" name="3 Imagen"/>
+          <p:cNvPicPr/>
+          <p:nvPr/>
+        </p:nvPicPr>
+        <p:blipFill>
+          <a:blip r:embed="rId2">
+            <a:extLst>
+              <a:ext uri="{28A0092B-C50C-407E-A947-70E740481C1C}">
+                <a14:useLocalDpi xmlns:a14="http://schemas.microsoft.com/office/drawing/2010/main" val="0"/>
+              </a:ext>
+            </a:extLst>
+          </a:blip>
+          <a:srcRect/>
+          <a:stretch>
+            <a:fillRect/>
+          </a:stretch>
+        </p:blipFill>
+        <p:spPr bwMode="auto">
+          <a:xfrm>
+            <a:off x="1619672" y="2708920"/>
+            <a:ext cx="5391150" cy="3448050"/>
+          </a:xfrm>
+          <a:prstGeom prst="rect">
+            <a:avLst/>
+          </a:prstGeom>
+          <a:noFill/>
+          <a:ln>
+            <a:noFill/>
+          </a:ln>
+        </p:spPr>
+      </p:pic>
+    </p:spTree>
+    <p:extLst>
+      <p:ext uri="{BB962C8B-B14F-4D97-AF65-F5344CB8AC3E}">
+        <p14:creationId xmlns:p14="http://schemas.microsoft.com/office/powerpoint/2010/main" val="2485299519"/>
+      </p:ext>
+    </p:extLst>
+  </p:cSld>
+  <p:clrMapOvr>
+    <a:masterClrMapping/>
+  </p:clrMapOvr>
+</p:sld>
+</file>
+
+<file path=ppt/slides/slide12.xml><?xml version="1.0" encoding="utf-8"?>
+<p:sld xmlns:a="http://schemas.openxmlformats.org/drawingml/2006/main" xmlns:r="http://schemas.openxmlformats.org/officeDocument/2006/relationships" xmlns:p="http://schemas.openxmlformats.org/presentationml/2006/main">
+  <p:cSld>
+    <p:spTree>
+      <p:nvGrpSpPr>
+        <p:cNvPr id="1" name=""/>
+        <p:cNvGrpSpPr/>
+        <p:nvPr/>
+      </p:nvGrpSpPr>
+      <p:grpSpPr>
+        <a:xfrm>
+          <a:off x="0" y="0"/>
+          <a:ext cx="0" cy="0"/>
+          <a:chOff x="0" y="0"/>
+          <a:chExt cx="0" cy="0"/>
+        </a:xfrm>
+      </p:grpSpPr>
+      <p:sp>
+        <p:nvSpPr>
+          <p:cNvPr id="2" name="1 Título"/>
+          <p:cNvSpPr>
+            <a:spLocks noGrp="1"/>
+          </p:cNvSpPr>
+          <p:nvPr>
+            <p:ph type="title"/>
+          </p:nvPr>
+        </p:nvSpPr>
+        <p:spPr/>
+        <p:txBody>
+          <a:bodyPr/>
+          <a:lstStyle/>
+          <a:p>
+            <a:r>
+              <a:rPr lang="es-ES" dirty="0" smtClean="0"/>
+              <a:t>Patrones de Diseño</a:t>
+            </a:r>
+            <a:endParaRPr lang="es-ES" dirty="0"/>
+          </a:p>
+        </p:txBody>
+      </p:sp>
+      <p:sp>
+        <p:nvSpPr>
+          <p:cNvPr id="3" name="2 Marcador de contenido"/>
+          <p:cNvSpPr>
+            <a:spLocks noGrp="1"/>
+          </p:cNvSpPr>
+          <p:nvPr>
+            <p:ph idx="1"/>
+          </p:nvPr>
+        </p:nvSpPr>
+        <p:spPr/>
+        <p:txBody>
+          <a:bodyPr>
+            <a:normAutofit fontScale="92500" lnSpcReduction="10000"/>
+          </a:bodyPr>
+          <a:lstStyle/>
+          <a:p>
+            <a:r>
+              <a:rPr lang="es-ES" dirty="0" smtClean="0"/>
+              <a:t>Patrón </a:t>
+            </a:r>
+            <a:r>
+              <a:rPr lang="es-ES" dirty="0" err="1" smtClean="0"/>
+              <a:t>Singleton</a:t>
+            </a:r>
+            <a:r>
+              <a:rPr lang="es-ES" dirty="0" smtClean="0"/>
+              <a:t>:</a:t>
+            </a:r>
+          </a:p>
+          <a:p>
+            <a:endParaRPr lang="es-ES" dirty="0"/>
+          </a:p>
+          <a:p>
+            <a:pPr marL="64008" indent="0">
+              <a:buNone/>
+            </a:pPr>
+            <a:r>
+              <a:rPr lang="en-US" sz="2600" b="1" dirty="0"/>
+              <a:t>private</a:t>
+            </a:r>
+            <a:r>
+              <a:rPr lang="en-US" sz="2600" dirty="0"/>
+              <a:t> </a:t>
+            </a:r>
+            <a:r>
+              <a:rPr lang="en-US" sz="2600" b="1" dirty="0"/>
+              <a:t>static</a:t>
+            </a:r>
+            <a:r>
+              <a:rPr lang="en-US" sz="2600" dirty="0"/>
+              <a:t> </a:t>
+            </a:r>
+            <a:r>
+              <a:rPr lang="en-US" sz="2600" dirty="0" err="1"/>
+              <a:t>BdDStock</a:t>
+            </a:r>
+            <a:r>
+              <a:rPr lang="en-US" sz="2600" dirty="0"/>
+              <a:t> </a:t>
+            </a:r>
+            <a:r>
+              <a:rPr lang="en-US" sz="2600" i="1" dirty="0" err="1"/>
+              <a:t>uniqueInstance</a:t>
+            </a:r>
+            <a:r>
+              <a:rPr lang="en-US" sz="2600" dirty="0"/>
+              <a:t> = </a:t>
+            </a:r>
+            <a:r>
+              <a:rPr lang="en-US" sz="2600" b="1" dirty="0"/>
+              <a:t>null</a:t>
+            </a:r>
+            <a:r>
+              <a:rPr lang="en-US" sz="2600" dirty="0"/>
+              <a:t>;</a:t>
+            </a:r>
+            <a:endParaRPr lang="es-ES" sz="2600" dirty="0"/>
+          </a:p>
+          <a:p>
+            <a:pPr marL="64008" indent="0">
+              <a:buNone/>
+            </a:pPr>
+            <a:r>
+              <a:rPr lang="en-US" sz="2600" dirty="0"/>
+              <a:t>	</a:t>
+            </a:r>
+            <a:endParaRPr lang="es-ES" sz="2600" dirty="0"/>
+          </a:p>
+          <a:p>
+            <a:pPr marL="64008" indent="0">
+              <a:buNone/>
+            </a:pPr>
+            <a:r>
+              <a:rPr lang="en-US" sz="2600" dirty="0"/>
+              <a:t>	</a:t>
+            </a:r>
+            <a:r>
+              <a:rPr lang="en-US" sz="2600" b="1" dirty="0"/>
+              <a:t>private</a:t>
+            </a:r>
+            <a:r>
+              <a:rPr lang="en-US" sz="2600" dirty="0"/>
+              <a:t> </a:t>
+            </a:r>
+            <a:r>
+              <a:rPr lang="en-US" sz="2600" dirty="0" err="1"/>
+              <a:t>BdDStock</a:t>
+            </a:r>
+            <a:r>
+              <a:rPr lang="en-US" sz="2600" dirty="0"/>
+              <a:t>(){}</a:t>
+            </a:r>
+            <a:endParaRPr lang="es-ES" sz="2600" dirty="0"/>
+          </a:p>
+          <a:p>
+            <a:pPr marL="64008" indent="0">
+              <a:buNone/>
+            </a:pPr>
+            <a:r>
+              <a:rPr lang="en-US" sz="2600" dirty="0"/>
+              <a:t>	</a:t>
+            </a:r>
+            <a:r>
+              <a:rPr lang="en-US" sz="2600" b="1" dirty="0"/>
+              <a:t>public</a:t>
+            </a:r>
+            <a:r>
+              <a:rPr lang="en-US" sz="2600" dirty="0"/>
+              <a:t> </a:t>
+            </a:r>
+            <a:r>
+              <a:rPr lang="en-US" sz="2600" b="1" dirty="0"/>
+              <a:t>static</a:t>
+            </a:r>
+            <a:r>
+              <a:rPr lang="en-US" sz="2600" dirty="0"/>
+              <a:t> </a:t>
+            </a:r>
+            <a:r>
+              <a:rPr lang="en-US" sz="2600" dirty="0" err="1"/>
+              <a:t>BdDStock</a:t>
+            </a:r>
+            <a:r>
+              <a:rPr lang="en-US" sz="2600" dirty="0"/>
+              <a:t> </a:t>
+            </a:r>
+            <a:r>
+              <a:rPr lang="en-US" sz="2600" dirty="0" err="1"/>
+              <a:t>getInstance</a:t>
+            </a:r>
+            <a:r>
+              <a:rPr lang="en-US" sz="2600" dirty="0"/>
+              <a:t>(){ </a:t>
+            </a:r>
+            <a:endParaRPr lang="es-ES" sz="2600" dirty="0"/>
+          </a:p>
+          <a:p>
+            <a:pPr marL="64008" indent="0">
+              <a:buNone/>
+            </a:pPr>
+            <a:r>
+              <a:rPr lang="en-US" sz="2600" dirty="0"/>
+              <a:t>		</a:t>
+            </a:r>
+            <a:r>
+              <a:rPr lang="en-US" sz="2600" b="1" dirty="0"/>
+              <a:t>if</a:t>
+            </a:r>
+            <a:r>
+              <a:rPr lang="en-US" sz="2600" dirty="0"/>
+              <a:t>  (</a:t>
+            </a:r>
+            <a:r>
+              <a:rPr lang="en-US" sz="2600" i="1" dirty="0" err="1"/>
+              <a:t>uniqueInstance</a:t>
+            </a:r>
+            <a:r>
+              <a:rPr lang="en-US" sz="2600" dirty="0"/>
+              <a:t>==</a:t>
+            </a:r>
+            <a:r>
+              <a:rPr lang="en-US" sz="2600" b="1" dirty="0"/>
+              <a:t>null</a:t>
+            </a:r>
+            <a:r>
+              <a:rPr lang="en-US" sz="2600" dirty="0"/>
+              <a:t>){</a:t>
+            </a:r>
+            <a:endParaRPr lang="es-ES" sz="2600" dirty="0"/>
+          </a:p>
+          <a:p>
+            <a:pPr marL="64008" indent="0">
+              <a:buNone/>
+            </a:pPr>
+            <a:r>
+              <a:rPr lang="en-US" sz="2600" dirty="0"/>
+              <a:t>			 </a:t>
+            </a:r>
+            <a:r>
+              <a:rPr lang="en-US" sz="2600" i="1" dirty="0" err="1"/>
+              <a:t>uniqueInstance</a:t>
+            </a:r>
+            <a:r>
+              <a:rPr lang="en-US" sz="2600" dirty="0"/>
+              <a:t>= </a:t>
+            </a:r>
+            <a:r>
+              <a:rPr lang="en-US" sz="2600" b="1" dirty="0"/>
+              <a:t>new</a:t>
+            </a:r>
+            <a:r>
+              <a:rPr lang="en-US" sz="2600" dirty="0"/>
+              <a:t> </a:t>
+            </a:r>
+            <a:r>
+              <a:rPr lang="en-US" sz="2600" dirty="0" err="1"/>
+              <a:t>BdDStock</a:t>
+            </a:r>
+            <a:r>
+              <a:rPr lang="en-US" sz="2600" dirty="0"/>
+              <a:t>();</a:t>
+            </a:r>
+            <a:endParaRPr lang="es-ES" sz="2600" dirty="0"/>
+          </a:p>
+          <a:p>
+            <a:pPr marL="64008" indent="0">
+              <a:buNone/>
+            </a:pPr>
+            <a:r>
+              <a:rPr lang="en-US" sz="2600" dirty="0"/>
+              <a:t>		</a:t>
+            </a:r>
+            <a:r>
+              <a:rPr lang="es-ES" sz="2600" dirty="0"/>
+              <a:t>}</a:t>
+            </a:r>
+          </a:p>
+          <a:p>
+            <a:pPr marL="64008" indent="0">
+              <a:buNone/>
+            </a:pPr>
+            <a:r>
+              <a:rPr lang="es-ES" sz="2600" dirty="0"/>
+              <a:t>		</a:t>
+            </a:r>
+            <a:r>
+              <a:rPr lang="es-ES" sz="2600" b="1" dirty="0" err="1"/>
+              <a:t>return</a:t>
+            </a:r>
+            <a:r>
+              <a:rPr lang="es-ES" sz="2600" dirty="0"/>
+              <a:t> </a:t>
+            </a:r>
+            <a:r>
+              <a:rPr lang="es-ES" sz="2600" i="1" dirty="0" err="1"/>
+              <a:t>uniqueInstance</a:t>
+            </a:r>
+            <a:r>
+              <a:rPr lang="es-ES" sz="2600" dirty="0"/>
+              <a:t>;</a:t>
+            </a:r>
+          </a:p>
+          <a:p>
+            <a:pPr marL="64008" indent="0">
+              <a:buNone/>
+            </a:pPr>
+            <a:r>
+              <a:rPr lang="es-ES" sz="2600" dirty="0"/>
+              <a:t>	}</a:t>
+            </a:r>
+          </a:p>
+          <a:p>
+            <a:endParaRPr lang="es-ES" dirty="0"/>
+          </a:p>
+        </p:txBody>
+      </p:sp>
+    </p:spTree>
+    <p:extLst>
+      <p:ext uri="{BB962C8B-B14F-4D97-AF65-F5344CB8AC3E}">
+        <p14:creationId xmlns:p14="http://schemas.microsoft.com/office/powerpoint/2010/main" val="2164050778"/>
+      </p:ext>
+    </p:extLst>
+  </p:cSld>
+  <p:clrMapOvr>
+    <a:masterClrMapping/>
+  </p:clrMapOvr>
+</p:sld>
+</file>
+
+<file path=ppt/slides/slide13.xml><?xml version="1.0" encoding="utf-8"?>
 <p:sld xmlns:a="http://schemas.openxmlformats.org/drawingml/2006/main" xmlns:r="http://schemas.openxmlformats.org/officeDocument/2006/relationships" xmlns:p="http://schemas.openxmlformats.org/presentationml/2006/main">
   <p:cSld>
     <p:spTree>
@@ -3803,7 +4381,7 @@
 </p:sld>
 </file>
 
-<file path=ppt/slides/slide11.xml><?xml version="1.0" encoding="utf-8"?>
+<file path=ppt/slides/slide14.xml><?xml version="1.0" encoding="utf-8"?>
 <p:sld xmlns:a="http://schemas.openxmlformats.org/drawingml/2006/main" xmlns:r="http://schemas.openxmlformats.org/officeDocument/2006/relationships" xmlns:p="http://schemas.openxmlformats.org/presentationml/2006/main">
   <p:cSld>
     <p:spTree>
@@ -3943,7 +4521,7 @@
 </p:sld>
 </file>
 
-<file path=ppt/slides/slide12.xml><?xml version="1.0" encoding="utf-8"?>
+<file path=ppt/slides/slide15.xml><?xml version="1.0" encoding="utf-8"?>
 <p:sld xmlns:a="http://schemas.openxmlformats.org/drawingml/2006/main" xmlns:r="http://schemas.openxmlformats.org/officeDocument/2006/relationships" xmlns:p="http://schemas.openxmlformats.org/presentationml/2006/main">
   <p:cSld>
     <p:spTree>
@@ -4089,7 +4667,7 @@
 </p:sld>
 </file>
 
-<file path=ppt/slides/slide13.xml><?xml version="1.0" encoding="utf-8"?>
+<file path=ppt/slides/slide16.xml><?xml version="1.0" encoding="utf-8"?>
 <p:sld xmlns:a="http://schemas.openxmlformats.org/drawingml/2006/main" xmlns:r="http://schemas.openxmlformats.org/officeDocument/2006/relationships" xmlns:p="http://schemas.openxmlformats.org/presentationml/2006/main">
   <p:cSld>
     <p:spTree>
@@ -4414,173 +4992,92 @@
             <p:ph type="title"/>
           </p:nvPr>
         </p:nvSpPr>
-        <p:spPr>
-          <a:xfrm>
-            <a:off x="467544" y="116632"/>
-            <a:ext cx="8229600" cy="1399032"/>
-          </a:xfrm>
-        </p:spPr>
+        <p:spPr/>
+        <p:txBody>
+          <a:bodyPr/>
+          <a:lstStyle/>
+          <a:p>
+            <a:pPr algn="ctr"/>
+            <a:r>
+              <a:rPr lang="es-ES" dirty="0" smtClean="0"/>
+              <a:t>Requerimientos funcionales</a:t>
+            </a:r>
+            <a:br>
+              <a:rPr lang="es-ES" dirty="0" smtClean="0"/>
+            </a:br>
+            <a:r>
+              <a:rPr lang="es-ES" dirty="0" smtClean="0"/>
+              <a:t>No implementados</a:t>
+            </a:r>
+            <a:endParaRPr lang="es-ES" dirty="0"/>
+          </a:p>
+        </p:txBody>
+      </p:sp>
+      <p:sp>
+        <p:nvSpPr>
+          <p:cNvPr id="3" name="2 Marcador de contenido"/>
+          <p:cNvSpPr>
+            <a:spLocks noGrp="1"/>
+          </p:cNvSpPr>
+          <p:nvPr>
+            <p:ph idx="1"/>
+          </p:nvPr>
+        </p:nvSpPr>
+        <p:spPr/>
         <p:txBody>
           <a:bodyPr>
             <a:normAutofit/>
           </a:bodyPr>
           <a:lstStyle/>
           <a:p>
-            <a:r>
-              <a:rPr lang="es-AR" sz="4000" dirty="0" smtClean="0"/>
-              <a:t>Requerimientos no funcionales</a:t>
-            </a:r>
-            <a:endParaRPr lang="es-ES" sz="4000" dirty="0"/>
-          </a:p>
-        </p:txBody>
-      </p:sp>
-      <p:sp>
-        <p:nvSpPr>
-          <p:cNvPr id="3" name="2 Marcador de contenido"/>
-          <p:cNvSpPr>
-            <a:spLocks noGrp="1"/>
-          </p:cNvSpPr>
-          <p:nvPr>
-            <p:ph idx="1"/>
-          </p:nvPr>
-        </p:nvSpPr>
-        <p:spPr>
-          <a:xfrm>
-            <a:off x="395536" y="1340768"/>
-            <a:ext cx="8229600" cy="5400600"/>
-          </a:xfrm>
-        </p:spPr>
-        <p:txBody>
-          <a:bodyPr>
-            <a:noAutofit/>
-          </a:bodyPr>
-          <a:lstStyle/>
+            <a:pPr>
+              <a:buFont typeface="Wingdings" pitchFamily="2" charset="2"/>
+              <a:buChar char="Ø"/>
+            </a:pPr>
+            <a:r>
+              <a:rPr lang="es-ES" sz="2400" dirty="0" smtClean="0"/>
+              <a:t>El cliente puede acceder a la descripción de los productos, y agregar estos a un carrito, y luego confirmar la compra de este.</a:t>
+            </a:r>
+          </a:p>
           <a:p>
             <a:pPr marL="64008" indent="0">
               <a:buNone/>
             </a:pPr>
-            <a:r>
-              <a:rPr lang="es-ES" sz="1600" b="1" i="1" dirty="0" smtClean="0"/>
-              <a:t>       Eficiencia</a:t>
-            </a:r>
-            <a:endParaRPr lang="es-ES" sz="1600" b="1" dirty="0"/>
-          </a:p>
-          <a:p>
-            <a:pPr lvl="0"/>
-            <a:r>
-              <a:rPr lang="es-ES" sz="1600" dirty="0"/>
-              <a:t>El sistema no debe tardar más de 300 mili segundos en abrir la descripción de un producto, si esto ocurriese el sistema lanzará un mensaje de error indicando que no puede conectarse con la base de datos.</a:t>
+            <a:endParaRPr lang="es-ES" sz="2400" dirty="0" smtClean="0"/>
+          </a:p>
+          <a:p>
+            <a:pPr>
+              <a:buFont typeface="Wingdings" pitchFamily="2" charset="2"/>
+              <a:buChar char="Ø"/>
+            </a:pPr>
+            <a:r>
+              <a:rPr lang="es-ES" sz="2400" dirty="0" smtClean="0"/>
+              <a:t>El administrador tiene acceso a la información de todos los clientes.</a:t>
             </a:r>
           </a:p>
           <a:p>
             <a:pPr marL="64008" indent="0">
               <a:buNone/>
             </a:pPr>
-            <a:r>
-              <a:rPr lang="es-ES" sz="1600" b="1" i="1" dirty="0" smtClean="0"/>
-              <a:t>       Usabilidad</a:t>
-            </a:r>
-            <a:endParaRPr lang="es-ES" sz="1600" b="1" dirty="0"/>
-          </a:p>
-          <a:p>
-            <a:pPr lvl="0"/>
-            <a:r>
-              <a:rPr lang="es-ES" sz="1600" dirty="0"/>
-              <a:t>El sistema será intuitivo y amigable, siendo fácil de usar incluso para personas con pocos conocimientos informáticos. </a:t>
-            </a:r>
-            <a:r>
-              <a:rPr lang="es-ES" sz="1600" i="1" dirty="0" smtClean="0"/>
-              <a:t>Seguridad</a:t>
-            </a:r>
-            <a:endParaRPr lang="es-ES" sz="1600" dirty="0"/>
-          </a:p>
-          <a:p>
-            <a:pPr lvl="0"/>
-            <a:r>
-              <a:rPr lang="es-ES" sz="1600" dirty="0"/>
-              <a:t>Ningún administrador del sistema podrá averiguar las contraseñas guardadas. </a:t>
-            </a:r>
-            <a:endParaRPr lang="es-ES" sz="1600" dirty="0" smtClean="0"/>
-          </a:p>
-          <a:p>
-            <a:pPr marL="64008" lvl="0" indent="0">
-              <a:buNone/>
+            <a:endParaRPr lang="es-ES" sz="2400" dirty="0" smtClean="0"/>
+          </a:p>
+          <a:p>
+            <a:pPr>
+              <a:buFont typeface="Wingdings" pitchFamily="2" charset="2"/>
+              <a:buChar char="Ø"/>
             </a:pPr>
             <a:r>
-              <a:rPr lang="es-ES" sz="1600" b="1" i="1" dirty="0" smtClean="0"/>
-              <a:t>       Confiabilidad</a:t>
-            </a:r>
-            <a:endParaRPr lang="es-ES" sz="1600" b="1" dirty="0"/>
-          </a:p>
-          <a:p>
-            <a:pPr lvl="0"/>
-            <a:r>
-              <a:rPr lang="es-ES" sz="1600" dirty="0"/>
-              <a:t>El sistema deberá poder verificar la autenticación de ingreso a este por parte del administrador autorizado y que le permita poder actualizar o eliminar información de los productos en la base de datos</a:t>
-            </a:r>
-          </a:p>
-          <a:p>
-            <a:pPr lvl="0"/>
-            <a:r>
-              <a:rPr lang="es-ES" sz="1600" dirty="0"/>
-              <a:t>Se realizarán frecuentemente copias de seguridad de la Base de Datos</a:t>
-            </a:r>
-            <a:r>
-              <a:rPr lang="es-ES" sz="1600" dirty="0" smtClean="0"/>
-              <a:t>.</a:t>
-            </a:r>
-          </a:p>
-          <a:p>
-            <a:pPr marL="64008" indent="0">
-              <a:buNone/>
-            </a:pPr>
-            <a:r>
-              <a:rPr lang="es-ES" sz="1600" b="1" i="1" dirty="0"/>
-              <a:t> </a:t>
-            </a:r>
-            <a:r>
-              <a:rPr lang="es-ES" sz="1600" b="1" i="1" dirty="0" smtClean="0"/>
-              <a:t>      Portabilidad</a:t>
-            </a:r>
-            <a:endParaRPr lang="es-ES" sz="1600" b="1" dirty="0" smtClean="0"/>
-          </a:p>
-          <a:p>
-            <a:pPr lvl="0"/>
-            <a:r>
-              <a:rPr lang="es-ES" sz="1600" dirty="0" smtClean="0"/>
-              <a:t>Sistemas operativos soportados: </a:t>
-            </a:r>
-            <a:r>
-              <a:rPr lang="es-ES" sz="1600" dirty="0"/>
-              <a:t>Windows7, Windows8, Linux.</a:t>
-            </a:r>
-          </a:p>
-          <a:p>
-            <a:pPr marL="64008" indent="0">
-              <a:buNone/>
-            </a:pPr>
-            <a:r>
-              <a:rPr lang="es-ES" sz="1600" b="1" i="1" dirty="0" smtClean="0"/>
-              <a:t>       Desarrollo</a:t>
-            </a:r>
-            <a:endParaRPr lang="es-ES" sz="1600" b="1" dirty="0"/>
-          </a:p>
-          <a:p>
-            <a:pPr lvl="0"/>
-            <a:r>
-              <a:rPr lang="es-ES" sz="1600" dirty="0"/>
-              <a:t>El  lenguaje  utilizado  para  implementar  la  tienda  virtual es  Java </a:t>
-            </a:r>
-          </a:p>
-          <a:p>
-            <a:endParaRPr lang="es-ES" sz="1600" dirty="0"/>
+              <a:rPr lang="es-ES" sz="2400" dirty="0" smtClean="0"/>
+              <a:t>Los clientes tienen acceso a su historial de compra.</a:t>
+            </a:r>
+            <a:endParaRPr lang="es-ES" sz="2400" dirty="0"/>
           </a:p>
         </p:txBody>
       </p:sp>
     </p:spTree>
     <p:extLst>
       <p:ext uri="{BB962C8B-B14F-4D97-AF65-F5344CB8AC3E}">
-        <p14:creationId xmlns:p14="http://schemas.microsoft.com/office/powerpoint/2010/main" val="3096532979"/>
+        <p14:creationId xmlns:p14="http://schemas.microsoft.com/office/powerpoint/2010/main" val="3936173798"/>
       </p:ext>
     </p:extLst>
   </p:cSld>
@@ -4617,7 +5114,12 @@
             <p:ph type="title"/>
           </p:nvPr>
         </p:nvSpPr>
-        <p:spPr/>
+        <p:spPr>
+          <a:xfrm>
+            <a:off x="467544" y="116632"/>
+            <a:ext cx="8229600" cy="1399032"/>
+          </a:xfrm>
+        </p:spPr>
         <p:txBody>
           <a:bodyPr>
             <a:normAutofit/>
@@ -4625,10 +5127,10 @@
           <a:lstStyle/>
           <a:p>
             <a:r>
-              <a:rPr lang="es-AR" dirty="0" smtClean="0"/>
-              <a:t>Arquitectura</a:t>
-            </a:r>
-            <a:endParaRPr lang="es-ES" dirty="0"/>
+              <a:rPr lang="es-AR" sz="4000" dirty="0" smtClean="0"/>
+              <a:t>Requerimientos no funcionales</a:t>
+            </a:r>
+            <a:endParaRPr lang="es-ES" sz="4000" dirty="0"/>
           </a:p>
         </p:txBody>
       </p:sp>
@@ -4644,91 +5146,186 @@
         </p:nvSpPr>
         <p:spPr>
           <a:xfrm>
-            <a:off x="457200" y="1556792"/>
-            <a:ext cx="8229600" cy="4898016"/>
-          </a:xfrm>
-        </p:spPr>
-        <p:txBody>
-          <a:bodyPr/>
+            <a:off x="395536" y="1340768"/>
+            <a:ext cx="8229600" cy="5400600"/>
+          </a:xfrm>
+        </p:spPr>
+        <p:txBody>
+          <a:bodyPr>
+            <a:noAutofit/>
+          </a:bodyPr>
           <a:lstStyle/>
           <a:p>
             <a:pPr marL="64008" indent="0">
               <a:buNone/>
             </a:pPr>
             <a:r>
-              <a:rPr lang="es-AR" dirty="0" smtClean="0"/>
-              <a:t>Se utilizo un </a:t>
-            </a:r>
-            <a:r>
-              <a:rPr lang="es-AR" dirty="0" smtClean="0"/>
-              <a:t>patrón </a:t>
-            </a:r>
-            <a:r>
-              <a:rPr lang="es-AR" dirty="0" smtClean="0"/>
-              <a:t>de arquitectura MVC para el </a:t>
-            </a:r>
-            <a:r>
-              <a:rPr lang="es-AR" dirty="0" smtClean="0"/>
-              <a:t>diseño </a:t>
-            </a:r>
-            <a:r>
-              <a:rPr lang="es-AR" dirty="0" smtClean="0"/>
-              <a:t>del sistema</a:t>
+              <a:rPr lang="es-ES" sz="1600" b="1" i="1" dirty="0" smtClean="0"/>
+              <a:t>       </a:t>
+            </a:r>
+            <a:r>
+              <a:rPr lang="es-ES" sz="1400" b="1" i="1" dirty="0" smtClean="0"/>
+              <a:t>Eficiencia</a:t>
+            </a:r>
+            <a:endParaRPr lang="es-ES" sz="1400" b="1" dirty="0"/>
+          </a:p>
+          <a:p>
+            <a:pPr lvl="0"/>
+            <a:r>
+              <a:rPr lang="es-ES" sz="1400" dirty="0"/>
+              <a:t>El sistema no debe tardar más de 300 mili segundos en abrir la descripción de un producto, si esto ocurriese el sistema lanzará un mensaje de error indicando que no puede conectarse con la base de datos.</a:t>
             </a:r>
           </a:p>
           <a:p>
             <a:pPr marL="64008" indent="0">
               <a:buNone/>
             </a:pPr>
-            <a:endParaRPr lang="es-AR" dirty="0"/>
-          </a:p>
-        </p:txBody>
-      </p:sp>
-      <p:pic>
-        <p:nvPicPr>
-          <p:cNvPr id="4" name="Picture 2" descr="C:\Users\Usuario\Downloads\Diagrama ARQ gral.JPG"/>
-          <p:cNvPicPr>
-            <a:picLocks noChangeAspect="1" noChangeArrowheads="1"/>
-          </p:cNvPicPr>
-          <p:nvPr/>
-        </p:nvPicPr>
-        <p:blipFill>
-          <a:blip r:embed="rId2">
-            <a:extLst>
-              <a:ext uri="{28A0092B-C50C-407E-A947-70E740481C1C}">
-                <a14:useLocalDpi xmlns:a14="http://schemas.microsoft.com/office/drawing/2010/main" val="0"/>
-              </a:ext>
-            </a:extLst>
-          </a:blip>
-          <a:srcRect/>
-          <a:stretch>
-            <a:fillRect/>
-          </a:stretch>
-        </p:blipFill>
-        <p:spPr bwMode="auto">
-          <a:xfrm>
-            <a:off x="611560" y="2564880"/>
-            <a:ext cx="7791450" cy="4032250"/>
-          </a:xfrm>
-          <a:prstGeom prst="rect">
-            <a:avLst/>
-          </a:prstGeom>
-          <a:noFill/>
-          <a:extLst>
-            <a:ext uri="{909E8E84-426E-40DD-AFC4-6F175D3DCCD1}">
-              <a14:hiddenFill xmlns:a14="http://schemas.microsoft.com/office/drawing/2010/main">
-                <a:solidFill>
-                  <a:srgbClr val="FFFFFF"/>
-                </a:solidFill>
-              </a14:hiddenFill>
-            </a:ext>
-          </a:extLst>
-        </p:spPr>
-      </p:pic>
+            <a:r>
+              <a:rPr lang="es-ES" sz="1400" b="1" i="1" dirty="0" smtClean="0"/>
+              <a:t>       Usabilidad</a:t>
+            </a:r>
+            <a:endParaRPr lang="es-ES" sz="1400" b="1" dirty="0"/>
+          </a:p>
+          <a:p>
+            <a:pPr lvl="0"/>
+            <a:r>
+              <a:rPr lang="es-ES" sz="1400" dirty="0"/>
+              <a:t>El sistema será intuitivo y amigable, siendo fácil de usar incluso para personas con pocos conocimientos informáticos. </a:t>
+            </a:r>
+            <a:r>
+              <a:rPr lang="es-ES" sz="1400" i="1" dirty="0" smtClean="0"/>
+              <a:t>Seguridad</a:t>
+            </a:r>
+            <a:endParaRPr lang="es-ES" sz="1400" dirty="0"/>
+          </a:p>
+          <a:p>
+            <a:pPr lvl="0"/>
+            <a:r>
+              <a:rPr lang="es-ES" sz="1400" dirty="0"/>
+              <a:t>Ningún administrador del sistema podrá averiguar las contraseñas guardadas. </a:t>
+            </a:r>
+            <a:endParaRPr lang="es-ES" sz="1400" dirty="0" smtClean="0"/>
+          </a:p>
+          <a:p>
+            <a:pPr marL="64008" lvl="0" indent="0">
+              <a:buNone/>
+            </a:pPr>
+            <a:r>
+              <a:rPr lang="es-ES" sz="1400" b="1" i="1" dirty="0" smtClean="0"/>
+              <a:t>       Confiabilidad</a:t>
+            </a:r>
+            <a:endParaRPr lang="es-ES" sz="1400" b="1" dirty="0"/>
+          </a:p>
+          <a:p>
+            <a:pPr lvl="0"/>
+            <a:r>
+              <a:rPr lang="es-ES" sz="1400" dirty="0"/>
+              <a:t>El sistema deberá poder verificar la autenticación de ingreso a este por parte del administrador autorizado y que le permita poder actualizar o eliminar información de los productos en la base de datos</a:t>
+            </a:r>
+          </a:p>
+          <a:p>
+            <a:pPr lvl="0"/>
+            <a:r>
+              <a:rPr lang="es-ES" sz="1400" dirty="0"/>
+              <a:t>Se realizarán frecuentemente copias de seguridad de la Base de Datos</a:t>
+            </a:r>
+            <a:r>
+              <a:rPr lang="es-ES" sz="1400" dirty="0" smtClean="0"/>
+              <a:t>.</a:t>
+            </a:r>
+          </a:p>
+          <a:p>
+            <a:pPr marL="64008" indent="0">
+              <a:buNone/>
+            </a:pPr>
+            <a:r>
+              <a:rPr lang="es-ES" sz="1400" b="1" i="1" dirty="0"/>
+              <a:t> </a:t>
+            </a:r>
+            <a:r>
+              <a:rPr lang="es-ES" sz="1400" b="1" i="1" dirty="0" smtClean="0"/>
+              <a:t>      Portabilidad</a:t>
+            </a:r>
+            <a:endParaRPr lang="es-ES" sz="1400" b="1" dirty="0" smtClean="0"/>
+          </a:p>
+          <a:p>
+            <a:pPr lvl="0"/>
+            <a:r>
+              <a:rPr lang="es-ES" sz="1400" dirty="0" smtClean="0"/>
+              <a:t>Sistemas operativos soportados: </a:t>
+            </a:r>
+            <a:r>
+              <a:rPr lang="es-ES" sz="1400" dirty="0"/>
+              <a:t>Windows7, Windows8, Linux.</a:t>
+            </a:r>
+          </a:p>
+          <a:p>
+            <a:pPr marL="64008" indent="0">
+              <a:buNone/>
+            </a:pPr>
+            <a:r>
+              <a:rPr lang="es-ES" sz="1400" b="1" i="1" dirty="0" smtClean="0"/>
+              <a:t>       Desarrollo</a:t>
+            </a:r>
+            <a:endParaRPr lang="es-ES" sz="1400" b="1" dirty="0"/>
+          </a:p>
+          <a:p>
+            <a:pPr lvl="0"/>
+            <a:r>
+              <a:rPr lang="es-ES" sz="1400" dirty="0"/>
+              <a:t>El </a:t>
+            </a:r>
+            <a:r>
+              <a:rPr lang="es-ES" sz="1400" dirty="0"/>
+              <a:t> </a:t>
+            </a:r>
+            <a:r>
+              <a:rPr lang="es-ES" sz="1400" dirty="0" smtClean="0"/>
+              <a:t>lenguaje</a:t>
+            </a:r>
+            <a:r>
+              <a:rPr lang="es-ES" sz="1400" dirty="0"/>
+              <a:t>  utilizado  para  implementar  la  tienda  virtual es  Java </a:t>
+            </a:r>
+            <a:endParaRPr lang="es-ES" sz="1400" dirty="0" smtClean="0"/>
+          </a:p>
+          <a:p>
+            <a:pPr marL="64008" lvl="0" indent="0">
+              <a:buNone/>
+            </a:pPr>
+            <a:r>
+              <a:rPr lang="es-ES" sz="1400" dirty="0" smtClean="0"/>
+              <a:t>       </a:t>
+            </a:r>
+            <a:r>
+              <a:rPr lang="es-ES" sz="1400" b="1" dirty="0" smtClean="0"/>
+              <a:t>Mantenibilidad</a:t>
+            </a:r>
+            <a:endParaRPr lang="es-ES" sz="1400" b="1" dirty="0"/>
+          </a:p>
+          <a:p>
+            <a:r>
+              <a:rPr lang="es-ES" sz="1400" dirty="0" smtClean="0"/>
+              <a:t>El código debe estar optimizado y  organizado para soportar cambios o el agregado de nuevos </a:t>
+            </a:r>
+            <a:r>
+              <a:rPr lang="es-ES" sz="1400" dirty="0" err="1" smtClean="0"/>
+              <a:t>modulos</a:t>
+            </a:r>
+            <a:r>
+              <a:rPr lang="es-ES" sz="1400" dirty="0" smtClean="0"/>
+              <a:t>.</a:t>
+            </a:r>
+          </a:p>
+          <a:p>
+            <a:endParaRPr lang="es-ES" sz="1600" dirty="0"/>
+          </a:p>
+        </p:txBody>
+      </p:sp>
     </p:spTree>
     <p:extLst>
       <p:ext uri="{BB962C8B-B14F-4D97-AF65-F5344CB8AC3E}">
-        <p14:creationId xmlns:p14="http://schemas.microsoft.com/office/powerpoint/2010/main" val="987346929"/>
+        <p14:creationId xmlns:p14="http://schemas.microsoft.com/office/powerpoint/2010/main" val="3096532979"/>
       </p:ext>
     </p:extLst>
   </p:cSld>
@@ -4767,910 +5364,100 @@
         </p:nvSpPr>
         <p:spPr/>
         <p:txBody>
+          <a:bodyPr>
+            <a:normAutofit/>
+          </a:bodyPr>
+          <a:lstStyle/>
+          <a:p>
+            <a:r>
+              <a:rPr lang="es-AR" dirty="0" smtClean="0"/>
+              <a:t>Arquitectura</a:t>
+            </a:r>
+            <a:endParaRPr lang="es-ES" dirty="0"/>
+          </a:p>
+        </p:txBody>
+      </p:sp>
+      <p:sp>
+        <p:nvSpPr>
+          <p:cNvPr id="3" name="2 Marcador de contenido"/>
+          <p:cNvSpPr>
+            <a:spLocks noGrp="1"/>
+          </p:cNvSpPr>
+          <p:nvPr>
+            <p:ph idx="1"/>
+          </p:nvPr>
+        </p:nvSpPr>
+        <p:spPr>
+          <a:xfrm>
+            <a:off x="457200" y="1556792"/>
+            <a:ext cx="8229600" cy="4898016"/>
+          </a:xfrm>
+        </p:spPr>
+        <p:txBody>
           <a:bodyPr/>
           <a:lstStyle/>
           <a:p>
+            <a:pPr marL="64008" indent="0">
+              <a:buNone/>
+            </a:pPr>
             <a:r>
               <a:rPr lang="es-AR" dirty="0" smtClean="0"/>
-              <a:t>Arquitectura	</a:t>
-            </a:r>
-            <a:endParaRPr lang="es-ES" dirty="0"/>
-          </a:p>
-        </p:txBody>
-      </p:sp>
-      <p:sp>
-        <p:nvSpPr>
-          <p:cNvPr id="3" name="2 Marcador de contenido"/>
-          <p:cNvSpPr>
-            <a:spLocks noGrp="1"/>
-          </p:cNvSpPr>
-          <p:nvPr>
-            <p:ph idx="1"/>
-          </p:nvPr>
-        </p:nvSpPr>
-        <p:spPr/>
-        <p:txBody>
-          <a:bodyPr>
-            <a:normAutofit fontScale="92500" lnSpcReduction="10000"/>
-          </a:bodyPr>
-          <a:lstStyle/>
-          <a:p>
-            <a:pPr>
-              <a:lnSpc>
-                <a:spcPct val="100000"/>
-              </a:lnSpc>
+              <a:t>Se utilizo un patrón de arquitectura MVC para el diseño del sistema</a:t>
+            </a:r>
+          </a:p>
+          <a:p>
+            <a:pPr marL="64008" indent="0">
+              <a:buNone/>
             </a:pPr>
-            <a:r>
-              <a:rPr lang="en-US" sz="3200" b="1" spc="-1" dirty="0">
-                <a:uFill>
-                  <a:solidFill>
-                    <a:srgbClr val="FFFFFF"/>
-                  </a:solidFill>
-                </a:uFill>
-                <a:latin typeface="Corbel"/>
-              </a:rPr>
-              <a:t>Se ha </a:t>
-            </a:r>
-            <a:r>
-              <a:rPr lang="en-US" sz="3200" b="1" spc="-1" dirty="0" err="1">
-                <a:uFill>
-                  <a:solidFill>
-                    <a:srgbClr val="FFFFFF"/>
-                  </a:solidFill>
-                </a:uFill>
-                <a:latin typeface="Corbel"/>
-              </a:rPr>
-              <a:t>utilizado</a:t>
-            </a:r>
-            <a:r>
-              <a:rPr lang="en-US" sz="3200" b="1" spc="-1" dirty="0">
-                <a:uFill>
-                  <a:solidFill>
-                    <a:srgbClr val="FFFFFF"/>
-                  </a:solidFill>
-                </a:uFill>
-                <a:latin typeface="Corbel"/>
-              </a:rPr>
-              <a:t> el </a:t>
-            </a:r>
-            <a:r>
-              <a:rPr lang="en-US" sz="3200" b="1" spc="-1" dirty="0" err="1">
-                <a:uFill>
-                  <a:solidFill>
-                    <a:srgbClr val="FFFFFF"/>
-                  </a:solidFill>
-                </a:uFill>
-                <a:latin typeface="Corbel"/>
-              </a:rPr>
-              <a:t>patrón</a:t>
-            </a:r>
-            <a:r>
-              <a:rPr lang="en-US" sz="3200" b="1" spc="-1" dirty="0">
-                <a:uFill>
-                  <a:solidFill>
-                    <a:srgbClr val="FFFFFF"/>
-                  </a:solidFill>
-                </a:uFill>
-                <a:latin typeface="Corbel"/>
-              </a:rPr>
-              <a:t> de </a:t>
-            </a:r>
-            <a:r>
-              <a:rPr lang="en-US" sz="3200" b="1" spc="-1" dirty="0" err="1">
-                <a:uFill>
-                  <a:solidFill>
-                    <a:srgbClr val="FFFFFF"/>
-                  </a:solidFill>
-                </a:uFill>
-                <a:latin typeface="Corbel"/>
-              </a:rPr>
-              <a:t>arquitectura</a:t>
-            </a:r>
-            <a:r>
-              <a:rPr lang="en-US" sz="3200" b="1" spc="-1" dirty="0">
-                <a:uFill>
-                  <a:solidFill>
-                    <a:srgbClr val="FFFFFF"/>
-                  </a:solidFill>
-                </a:uFill>
-                <a:latin typeface="Corbel"/>
-              </a:rPr>
-              <a:t> MVC </a:t>
-            </a:r>
-            <a:r>
-              <a:rPr lang="en-US" sz="3200" b="1" spc="-1" dirty="0" err="1">
-                <a:uFill>
-                  <a:solidFill>
-                    <a:srgbClr val="FFFFFF"/>
-                  </a:solidFill>
-                </a:uFill>
-                <a:latin typeface="Corbel"/>
-              </a:rPr>
-              <a:t>ya</a:t>
-            </a:r>
-            <a:r>
-              <a:rPr lang="en-US" sz="3200" b="1" spc="-1" dirty="0">
-                <a:uFill>
-                  <a:solidFill>
-                    <a:srgbClr val="FFFFFF"/>
-                  </a:solidFill>
-                </a:uFill>
-                <a:latin typeface="Corbel"/>
-              </a:rPr>
-              <a:t> que </a:t>
-            </a:r>
-            <a:r>
-              <a:rPr lang="en-US" sz="3200" b="1" spc="-1" dirty="0" err="1">
-                <a:uFill>
-                  <a:solidFill>
-                    <a:srgbClr val="FFFFFF"/>
-                  </a:solidFill>
-                </a:uFill>
-                <a:latin typeface="Corbel"/>
-              </a:rPr>
-              <a:t>brinda</a:t>
-            </a:r>
-            <a:r>
-              <a:rPr lang="en-US" sz="3200" b="1" spc="-1" dirty="0">
-                <a:uFill>
-                  <a:solidFill>
-                    <a:srgbClr val="FFFFFF"/>
-                  </a:solidFill>
-                </a:uFill>
-                <a:latin typeface="Corbel"/>
-              </a:rPr>
-              <a:t> al </a:t>
-            </a:r>
-            <a:r>
-              <a:rPr lang="en-US" sz="3200" b="1" spc="-1" dirty="0" err="1">
-                <a:uFill>
-                  <a:solidFill>
-                    <a:srgbClr val="FFFFFF"/>
-                  </a:solidFill>
-                </a:uFill>
-                <a:latin typeface="Corbel"/>
-              </a:rPr>
-              <a:t>proyecto</a:t>
-            </a:r>
-            <a:r>
-              <a:rPr lang="en-US" sz="3200" b="1" spc="-1" dirty="0">
-                <a:uFill>
-                  <a:solidFill>
-                    <a:srgbClr val="FFFFFF"/>
-                  </a:solidFill>
-                </a:uFill>
-                <a:latin typeface="Corbel"/>
-              </a:rPr>
-              <a:t> </a:t>
-            </a:r>
-            <a:r>
-              <a:rPr lang="en-US" sz="3200" b="1" spc="-1" dirty="0" err="1">
-                <a:uFill>
-                  <a:solidFill>
-                    <a:srgbClr val="FFFFFF"/>
-                  </a:solidFill>
-                </a:uFill>
-                <a:latin typeface="Corbel"/>
-              </a:rPr>
-              <a:t>distintas</a:t>
-            </a:r>
-            <a:r>
-              <a:rPr lang="en-US" sz="3200" b="1" spc="-1" dirty="0">
-                <a:uFill>
-                  <a:solidFill>
-                    <a:srgbClr val="FFFFFF"/>
-                  </a:solidFill>
-                </a:uFill>
-                <a:latin typeface="Corbel"/>
-              </a:rPr>
-              <a:t> </a:t>
-            </a:r>
-            <a:r>
-              <a:rPr lang="en-US" sz="3200" b="1" spc="-1" dirty="0" err="1">
-                <a:uFill>
-                  <a:solidFill>
-                    <a:srgbClr val="FFFFFF"/>
-                  </a:solidFill>
-                </a:uFill>
-                <a:latin typeface="Corbel"/>
-              </a:rPr>
-              <a:t>ventajas</a:t>
-            </a:r>
-            <a:r>
-              <a:rPr lang="en-US" sz="3200" b="1" spc="-1" dirty="0">
-                <a:uFill>
-                  <a:solidFill>
-                    <a:srgbClr val="FFFFFF"/>
-                  </a:solidFill>
-                </a:uFill>
-                <a:latin typeface="Corbel"/>
-              </a:rPr>
-              <a:t> que </a:t>
-            </a:r>
-            <a:r>
-              <a:rPr lang="en-US" sz="3200" b="1" spc="-1" dirty="0" err="1">
-                <a:uFill>
-                  <a:solidFill>
-                    <a:srgbClr val="FFFFFF"/>
-                  </a:solidFill>
-                </a:uFill>
-                <a:latin typeface="Corbel"/>
-              </a:rPr>
-              <a:t>justifican</a:t>
-            </a:r>
-            <a:r>
-              <a:rPr lang="en-US" sz="3200" b="1" spc="-1" dirty="0">
-                <a:uFill>
-                  <a:solidFill>
-                    <a:srgbClr val="FFFFFF"/>
-                  </a:solidFill>
-                </a:uFill>
-                <a:latin typeface="Corbel"/>
-              </a:rPr>
-              <a:t> </a:t>
-            </a:r>
-            <a:r>
-              <a:rPr lang="en-US" sz="3200" b="1" spc="-1" dirty="0" err="1">
-                <a:uFill>
-                  <a:solidFill>
-                    <a:srgbClr val="FFFFFF"/>
-                  </a:solidFill>
-                </a:uFill>
-                <a:latin typeface="Corbel"/>
-              </a:rPr>
-              <a:t>su</a:t>
-            </a:r>
-            <a:r>
-              <a:rPr lang="en-US" sz="3200" b="1" spc="-1" dirty="0">
-                <a:uFill>
-                  <a:solidFill>
-                    <a:srgbClr val="FFFFFF"/>
-                  </a:solidFill>
-                </a:uFill>
-                <a:latin typeface="Corbel"/>
-              </a:rPr>
-              <a:t> </a:t>
-            </a:r>
-            <a:r>
-              <a:rPr lang="en-US" sz="3200" b="1" spc="-1" dirty="0" err="1">
-                <a:uFill>
-                  <a:solidFill>
-                    <a:srgbClr val="FFFFFF"/>
-                  </a:solidFill>
-                </a:uFill>
-                <a:latin typeface="Corbel"/>
-              </a:rPr>
-              <a:t>aplicación</a:t>
-            </a:r>
-            <a:r>
-              <a:rPr lang="en-US" sz="3200" spc="-1" dirty="0">
-                <a:uFill>
-                  <a:solidFill>
-                    <a:srgbClr val="FFFFFF"/>
-                  </a:solidFill>
-                </a:uFill>
-                <a:latin typeface="Corbel"/>
-              </a:rPr>
-              <a:t>:</a:t>
-            </a:r>
-          </a:p>
-          <a:p>
-            <a:pPr marL="228600" indent="-228240">
-              <a:lnSpc>
-                <a:spcPct val="90000"/>
-              </a:lnSpc>
-              <a:buClr>
-                <a:srgbClr val="FFFFFF"/>
-              </a:buClr>
-              <a:buFont typeface="Arial"/>
-              <a:buChar char="•"/>
-            </a:pPr>
-            <a:r>
-              <a:rPr lang="en-US" sz="3200" spc="-1" dirty="0" err="1">
-                <a:uFill>
-                  <a:solidFill>
-                    <a:srgbClr val="FFFFFF"/>
-                  </a:solidFill>
-                </a:uFill>
-                <a:latin typeface="Corbel"/>
-              </a:rPr>
-              <a:t>Proporciona</a:t>
-            </a:r>
-            <a:r>
-              <a:rPr lang="en-US" sz="3200" spc="-1" dirty="0">
-                <a:uFill>
-                  <a:solidFill>
-                    <a:srgbClr val="FFFFFF"/>
-                  </a:solidFill>
-                </a:uFill>
-                <a:latin typeface="Corbel"/>
-              </a:rPr>
-              <a:t> </a:t>
-            </a:r>
-            <a:r>
-              <a:rPr lang="en-US" sz="3200" spc="-1" dirty="0" err="1">
-                <a:uFill>
-                  <a:solidFill>
-                    <a:srgbClr val="FFFFFF"/>
-                  </a:solidFill>
-                </a:uFill>
-                <a:latin typeface="Corbel"/>
-              </a:rPr>
-              <a:t>mantenibilidad</a:t>
-            </a:r>
-            <a:r>
-              <a:rPr lang="en-US" sz="3200" spc="-1" dirty="0">
-                <a:uFill>
-                  <a:solidFill>
-                    <a:srgbClr val="FFFFFF"/>
-                  </a:solidFill>
-                </a:uFill>
-                <a:latin typeface="Corbel"/>
-              </a:rPr>
-              <a:t>, se </a:t>
-            </a:r>
-            <a:r>
-              <a:rPr lang="en-US" sz="3200" spc="-1" dirty="0" err="1">
-                <a:uFill>
-                  <a:solidFill>
-                    <a:srgbClr val="FFFFFF"/>
-                  </a:solidFill>
-                </a:uFill>
-                <a:latin typeface="Corbel"/>
-              </a:rPr>
-              <a:t>tiene</a:t>
-            </a:r>
-            <a:r>
-              <a:rPr lang="en-US" sz="3200" spc="-1" dirty="0">
-                <a:uFill>
-                  <a:solidFill>
-                    <a:srgbClr val="FFFFFF"/>
-                  </a:solidFill>
-                </a:uFill>
-                <a:latin typeface="Corbel"/>
-              </a:rPr>
-              <a:t> un </a:t>
-            </a:r>
-            <a:r>
-              <a:rPr lang="en-US" sz="3200" spc="-1" dirty="0" err="1">
-                <a:uFill>
-                  <a:solidFill>
-                    <a:srgbClr val="FFFFFF"/>
-                  </a:solidFill>
-                </a:uFill>
-                <a:latin typeface="Corbel"/>
-              </a:rPr>
-              <a:t>código</a:t>
-            </a:r>
-            <a:r>
-              <a:rPr lang="en-US" sz="3200" spc="-1" dirty="0">
-                <a:uFill>
-                  <a:solidFill>
-                    <a:srgbClr val="FFFFFF"/>
-                  </a:solidFill>
-                </a:uFill>
-                <a:latin typeface="Corbel"/>
-              </a:rPr>
-              <a:t> </a:t>
-            </a:r>
-            <a:r>
-              <a:rPr lang="en-US" sz="3200" spc="-1" dirty="0" err="1">
-                <a:uFill>
-                  <a:solidFill>
-                    <a:srgbClr val="FFFFFF"/>
-                  </a:solidFill>
-                </a:uFill>
-                <a:latin typeface="Corbel"/>
-              </a:rPr>
-              <a:t>más</a:t>
-            </a:r>
-            <a:r>
-              <a:rPr lang="en-US" sz="3200" spc="-1" dirty="0">
-                <a:uFill>
-                  <a:solidFill>
-                    <a:srgbClr val="FFFFFF"/>
-                  </a:solidFill>
-                </a:uFill>
-                <a:latin typeface="Corbel"/>
-              </a:rPr>
-              <a:t> </a:t>
-            </a:r>
-            <a:r>
-              <a:rPr lang="en-US" sz="3200" spc="-1" dirty="0" err="1">
-                <a:uFill>
-                  <a:solidFill>
-                    <a:srgbClr val="FFFFFF"/>
-                  </a:solidFill>
-                </a:uFill>
-                <a:latin typeface="Corbel"/>
-              </a:rPr>
-              <a:t>fácil</a:t>
-            </a:r>
-            <a:r>
-              <a:rPr lang="en-US" sz="3200" spc="-1" dirty="0">
-                <a:uFill>
-                  <a:solidFill>
-                    <a:srgbClr val="FFFFFF"/>
-                  </a:solidFill>
-                </a:uFill>
-                <a:latin typeface="Corbel"/>
-              </a:rPr>
-              <a:t> de leer y </a:t>
-            </a:r>
-            <a:r>
-              <a:rPr lang="en-US" sz="3200" spc="-1" dirty="0" err="1">
-                <a:uFill>
-                  <a:solidFill>
-                    <a:srgbClr val="FFFFFF"/>
-                  </a:solidFill>
-                </a:uFill>
-                <a:latin typeface="Corbel"/>
-              </a:rPr>
-              <a:t>modificar</a:t>
-            </a:r>
-            <a:r>
-              <a:rPr lang="en-US" sz="3200" spc="-1" dirty="0">
-                <a:uFill>
-                  <a:solidFill>
-                    <a:srgbClr val="FFFFFF"/>
-                  </a:solidFill>
-                </a:uFill>
-                <a:latin typeface="Corbel"/>
-              </a:rPr>
-              <a:t>, </a:t>
-            </a:r>
-            <a:r>
-              <a:rPr lang="en-US" sz="3200" spc="-1" dirty="0" err="1">
-                <a:uFill>
-                  <a:solidFill>
-                    <a:srgbClr val="FFFFFF"/>
-                  </a:solidFill>
-                </a:uFill>
-                <a:latin typeface="Corbel"/>
-              </a:rPr>
-              <a:t>acomodándose</a:t>
-            </a:r>
-            <a:r>
-              <a:rPr lang="en-US" sz="3200" spc="-1" dirty="0">
-                <a:uFill>
-                  <a:solidFill>
-                    <a:srgbClr val="FFFFFF"/>
-                  </a:solidFill>
-                </a:uFill>
-                <a:latin typeface="Corbel"/>
-              </a:rPr>
-              <a:t> </a:t>
-            </a:r>
-            <a:r>
-              <a:rPr lang="en-US" sz="3200" spc="-1" dirty="0" err="1">
-                <a:uFill>
-                  <a:solidFill>
-                    <a:srgbClr val="FFFFFF"/>
-                  </a:solidFill>
-                </a:uFill>
-                <a:latin typeface="Corbel"/>
-              </a:rPr>
-              <a:t>mejor</a:t>
-            </a:r>
-            <a:r>
-              <a:rPr lang="en-US" sz="3200" spc="-1" dirty="0">
-                <a:uFill>
-                  <a:solidFill>
-                    <a:srgbClr val="FFFFFF"/>
-                  </a:solidFill>
-                </a:uFill>
-                <a:latin typeface="Corbel"/>
-              </a:rPr>
-              <a:t> para </a:t>
-            </a:r>
-            <a:r>
-              <a:rPr lang="en-US" sz="3200" spc="-1" dirty="0" err="1">
-                <a:uFill>
-                  <a:solidFill>
-                    <a:srgbClr val="FFFFFF"/>
-                  </a:solidFill>
-                </a:uFill>
-                <a:latin typeface="Corbel"/>
-              </a:rPr>
-              <a:t>cambios</a:t>
-            </a:r>
-            <a:r>
-              <a:rPr lang="en-US" sz="3200" spc="-1" dirty="0">
-                <a:uFill>
-                  <a:solidFill>
-                    <a:srgbClr val="FFFFFF"/>
-                  </a:solidFill>
-                </a:uFill>
-                <a:latin typeface="Corbel"/>
-              </a:rPr>
-              <a:t> </a:t>
-            </a:r>
-            <a:r>
-              <a:rPr lang="en-US" sz="3200" spc="-1" dirty="0" err="1">
-                <a:uFill>
-                  <a:solidFill>
-                    <a:srgbClr val="FFFFFF"/>
-                  </a:solidFill>
-                </a:uFill>
-                <a:latin typeface="Corbel"/>
-              </a:rPr>
-              <a:t>futuros</a:t>
-            </a:r>
-            <a:r>
-              <a:rPr lang="en-US" sz="3200" spc="-1" dirty="0">
-                <a:uFill>
-                  <a:solidFill>
-                    <a:srgbClr val="FFFFFF"/>
-                  </a:solidFill>
-                </a:uFill>
-                <a:latin typeface="Corbel"/>
-              </a:rPr>
-              <a:t>.</a:t>
-            </a:r>
-          </a:p>
-          <a:p>
-            <a:pPr marL="228600" indent="-228240">
-              <a:lnSpc>
-                <a:spcPct val="90000"/>
-              </a:lnSpc>
-              <a:buClr>
-                <a:srgbClr val="FFFFFF"/>
-              </a:buClr>
-              <a:buFont typeface="Arial"/>
-              <a:buChar char="•"/>
-            </a:pPr>
-            <a:r>
-              <a:rPr lang="en-US" sz="3200" spc="-1" dirty="0" err="1">
-                <a:uFill>
-                  <a:solidFill>
-                    <a:srgbClr val="FFFFFF"/>
-                  </a:solidFill>
-                </a:uFill>
-                <a:latin typeface="Corbel"/>
-              </a:rPr>
-              <a:t>Independencia</a:t>
-            </a:r>
-            <a:r>
-              <a:rPr lang="en-US" sz="3200" spc="-1" dirty="0">
-                <a:uFill>
-                  <a:solidFill>
-                    <a:srgbClr val="FFFFFF"/>
-                  </a:solidFill>
-                </a:uFill>
-                <a:latin typeface="Corbel"/>
-              </a:rPr>
-              <a:t> de ‘</a:t>
-            </a:r>
-            <a:r>
-              <a:rPr lang="en-US" sz="3200" spc="-1" dirty="0" err="1">
-                <a:uFill>
-                  <a:solidFill>
-                    <a:srgbClr val="FFFFFF"/>
-                  </a:solidFill>
-                </a:uFill>
-                <a:latin typeface="Corbel"/>
-              </a:rPr>
-              <a:t>capas</a:t>
-            </a:r>
-            <a:r>
-              <a:rPr lang="en-US" sz="3200" spc="-1" dirty="0">
-                <a:uFill>
-                  <a:solidFill>
-                    <a:srgbClr val="FFFFFF"/>
-                  </a:solidFill>
-                </a:uFill>
-                <a:latin typeface="Corbel"/>
-              </a:rPr>
-              <a:t>’, lo que </a:t>
-            </a:r>
-            <a:r>
-              <a:rPr lang="en-US" sz="3200" spc="-1" dirty="0" err="1">
-                <a:uFill>
-                  <a:solidFill>
-                    <a:srgbClr val="FFFFFF"/>
-                  </a:solidFill>
-                </a:uFill>
-                <a:latin typeface="Corbel"/>
-              </a:rPr>
-              <a:t>proporciona</a:t>
-            </a:r>
-            <a:r>
-              <a:rPr lang="en-US" sz="3200" spc="-1" dirty="0">
-                <a:uFill>
-                  <a:solidFill>
-                    <a:srgbClr val="FFFFFF"/>
-                  </a:solidFill>
-                </a:uFill>
-                <a:latin typeface="Corbel"/>
-              </a:rPr>
-              <a:t> la </a:t>
-            </a:r>
-            <a:r>
-              <a:rPr lang="en-US" sz="3200" spc="-1" dirty="0" err="1">
-                <a:uFill>
-                  <a:solidFill>
-                    <a:srgbClr val="FFFFFF"/>
-                  </a:solidFill>
-                </a:uFill>
-                <a:latin typeface="Corbel"/>
-              </a:rPr>
-              <a:t>habilidad</a:t>
-            </a:r>
-            <a:r>
-              <a:rPr lang="en-US" sz="3200" spc="-1" dirty="0">
-                <a:uFill>
-                  <a:solidFill>
-                    <a:srgbClr val="FFFFFF"/>
-                  </a:solidFill>
-                </a:uFill>
-                <a:latin typeface="Corbel"/>
-              </a:rPr>
-              <a:t> de </a:t>
-            </a:r>
-            <a:r>
-              <a:rPr lang="en-US" sz="3200" spc="-1" dirty="0" err="1">
-                <a:uFill>
-                  <a:solidFill>
-                    <a:srgbClr val="FFFFFF"/>
-                  </a:solidFill>
-                </a:uFill>
-                <a:latin typeface="Corbel"/>
-              </a:rPr>
-              <a:t>cambiar</a:t>
-            </a:r>
-            <a:r>
-              <a:rPr lang="en-US" sz="3200" spc="-1" dirty="0">
-                <a:uFill>
-                  <a:solidFill>
-                    <a:srgbClr val="FFFFFF"/>
-                  </a:solidFill>
-                </a:uFill>
-                <a:latin typeface="Corbel"/>
-              </a:rPr>
-              <a:t> la </a:t>
-            </a:r>
-            <a:r>
-              <a:rPr lang="en-US" sz="3200" spc="-1" dirty="0" err="1">
-                <a:uFill>
-                  <a:solidFill>
-                    <a:srgbClr val="FFFFFF"/>
-                  </a:solidFill>
-                </a:uFill>
-                <a:latin typeface="Corbel"/>
-              </a:rPr>
-              <a:t>implementación</a:t>
-            </a:r>
-            <a:r>
-              <a:rPr lang="en-US" sz="3200" spc="-1" dirty="0">
-                <a:uFill>
-                  <a:solidFill>
-                    <a:srgbClr val="FFFFFF"/>
-                  </a:solidFill>
-                </a:uFill>
-                <a:latin typeface="Corbel"/>
-              </a:rPr>
-              <a:t> de un </a:t>
-            </a:r>
-            <a:r>
-              <a:rPr lang="en-US" sz="3200" spc="-1" dirty="0" err="1">
-                <a:uFill>
-                  <a:solidFill>
-                    <a:srgbClr val="FFFFFF"/>
-                  </a:solidFill>
-                </a:uFill>
-                <a:latin typeface="Corbel"/>
-              </a:rPr>
-              <a:t>modelo</a:t>
-            </a:r>
-            <a:r>
-              <a:rPr lang="en-US" sz="3200" spc="-1" dirty="0">
-                <a:uFill>
-                  <a:solidFill>
-                    <a:srgbClr val="FFFFFF"/>
-                  </a:solidFill>
-                </a:uFill>
-                <a:latin typeface="Corbel"/>
-              </a:rPr>
-              <a:t> a </a:t>
-            </a:r>
-            <a:r>
-              <a:rPr lang="en-US" sz="3200" spc="-1" dirty="0" err="1">
-                <a:uFill>
-                  <a:solidFill>
-                    <a:srgbClr val="FFFFFF"/>
-                  </a:solidFill>
-                </a:uFill>
-                <a:latin typeface="Corbel"/>
-              </a:rPr>
-              <a:t>otro</a:t>
-            </a:r>
-            <a:r>
-              <a:rPr lang="en-US" sz="3200" spc="-1" dirty="0">
-                <a:uFill>
-                  <a:solidFill>
-                    <a:srgbClr val="FFFFFF"/>
-                  </a:solidFill>
-                </a:uFill>
-                <a:latin typeface="Corbel"/>
-              </a:rPr>
-              <a:t>.</a:t>
-            </a:r>
-          </a:p>
-          <a:p>
-            <a:pPr marL="228600" indent="-228240">
-              <a:lnSpc>
-                <a:spcPct val="90000"/>
-              </a:lnSpc>
-              <a:buClr>
-                <a:srgbClr val="FFFFFF"/>
-              </a:buClr>
-              <a:buFont typeface="Arial"/>
-              <a:buChar char="•"/>
-            </a:pPr>
-            <a:r>
-              <a:rPr lang="en-US" sz="3200" spc="-1" dirty="0" err="1">
-                <a:uFill>
-                  <a:solidFill>
-                    <a:srgbClr val="FFFFFF"/>
-                  </a:solidFill>
-                </a:uFill>
-                <a:latin typeface="Corbel"/>
-              </a:rPr>
-              <a:t>Facilita</a:t>
-            </a:r>
-            <a:r>
-              <a:rPr lang="en-US" sz="3200" spc="-1" dirty="0">
-                <a:uFill>
-                  <a:solidFill>
-                    <a:srgbClr val="FFFFFF"/>
-                  </a:solidFill>
-                </a:uFill>
-                <a:latin typeface="Corbel"/>
-              </a:rPr>
-              <a:t> el </a:t>
-            </a:r>
-            <a:r>
-              <a:rPr lang="en-US" sz="3200" spc="-1" dirty="0" err="1">
-                <a:uFill>
-                  <a:solidFill>
-                    <a:srgbClr val="FFFFFF"/>
-                  </a:solidFill>
-                </a:uFill>
-                <a:latin typeface="Corbel"/>
-              </a:rPr>
-              <a:t>uso</a:t>
-            </a:r>
-            <a:r>
-              <a:rPr lang="en-US" sz="3200" spc="-1" dirty="0">
-                <a:uFill>
-                  <a:solidFill>
-                    <a:srgbClr val="FFFFFF"/>
-                  </a:solidFill>
-                </a:uFill>
-                <a:latin typeface="Corbel"/>
-              </a:rPr>
-              <a:t> de Unit Testing al </a:t>
-            </a:r>
-            <a:r>
-              <a:rPr lang="en-US" sz="3200" spc="-1" dirty="0" err="1">
-                <a:uFill>
-                  <a:solidFill>
-                    <a:srgbClr val="FFFFFF"/>
-                  </a:solidFill>
-                </a:uFill>
-                <a:latin typeface="Corbel"/>
-              </a:rPr>
-              <a:t>dividir</a:t>
-            </a:r>
-            <a:r>
-              <a:rPr lang="en-US" sz="3200" spc="-1" dirty="0">
-                <a:uFill>
-                  <a:solidFill>
-                    <a:srgbClr val="FFFFFF"/>
-                  </a:solidFill>
-                </a:uFill>
-                <a:latin typeface="Corbel"/>
-              </a:rPr>
-              <a:t> al </a:t>
-            </a:r>
-            <a:r>
-              <a:rPr lang="en-US" sz="3200" spc="-1" dirty="0" err="1">
-                <a:uFill>
-                  <a:solidFill>
-                    <a:srgbClr val="FFFFFF"/>
-                  </a:solidFill>
-                </a:uFill>
-                <a:latin typeface="Corbel"/>
-              </a:rPr>
-              <a:t>sistema</a:t>
-            </a:r>
-            <a:r>
-              <a:rPr lang="en-US" sz="3200" spc="-1" dirty="0">
-                <a:uFill>
-                  <a:solidFill>
-                    <a:srgbClr val="FFFFFF"/>
-                  </a:solidFill>
-                </a:uFill>
-                <a:latin typeface="Corbel"/>
-              </a:rPr>
-              <a:t> </a:t>
-            </a:r>
-            <a:r>
-              <a:rPr lang="en-US" sz="3200" spc="-1" dirty="0" err="1">
-                <a:uFill>
-                  <a:solidFill>
-                    <a:srgbClr val="FFFFFF"/>
-                  </a:solidFill>
-                </a:uFill>
-                <a:latin typeface="Corbel"/>
-              </a:rPr>
-              <a:t>en</a:t>
-            </a:r>
-            <a:r>
-              <a:rPr lang="en-US" sz="3200" spc="-1" dirty="0">
-                <a:uFill>
-                  <a:solidFill>
-                    <a:srgbClr val="FFFFFF"/>
-                  </a:solidFill>
-                </a:uFill>
-                <a:latin typeface="Corbel"/>
-              </a:rPr>
-              <a:t> </a:t>
-            </a:r>
-            <a:r>
-              <a:rPr lang="en-US" sz="3200" spc="-1" dirty="0" err="1">
-                <a:uFill>
-                  <a:solidFill>
-                    <a:srgbClr val="FFFFFF"/>
-                  </a:solidFill>
-                </a:uFill>
-                <a:latin typeface="Corbel"/>
-              </a:rPr>
-              <a:t>tres</a:t>
-            </a:r>
-            <a:r>
-              <a:rPr lang="en-US" sz="3200" spc="-1" dirty="0">
-                <a:uFill>
-                  <a:solidFill>
-                    <a:srgbClr val="FFFFFF"/>
-                  </a:solidFill>
-                </a:uFill>
-                <a:latin typeface="Corbel"/>
-              </a:rPr>
-              <a:t> </a:t>
-            </a:r>
-            <a:r>
-              <a:rPr lang="en-US" sz="3200" spc="-1" dirty="0" err="1">
-                <a:uFill>
-                  <a:solidFill>
-                    <a:srgbClr val="FFFFFF"/>
-                  </a:solidFill>
-                </a:uFill>
-                <a:latin typeface="Corbel"/>
-              </a:rPr>
-              <a:t>piezas</a:t>
-            </a:r>
-            <a:r>
-              <a:rPr lang="en-US" sz="3200" spc="-1" dirty="0">
-                <a:uFill>
-                  <a:solidFill>
-                    <a:srgbClr val="FFFFFF"/>
-                  </a:solidFill>
-                </a:uFill>
-                <a:latin typeface="Corbel"/>
-              </a:rPr>
-              <a:t>.</a:t>
-            </a:r>
-          </a:p>
-          <a:p>
-            <a:endParaRPr lang="es-ES" dirty="0"/>
-          </a:p>
-        </p:txBody>
-      </p:sp>
+            <a:endParaRPr lang="es-AR" dirty="0"/>
+          </a:p>
+        </p:txBody>
+      </p:sp>
+      <p:pic>
+        <p:nvPicPr>
+          <p:cNvPr id="4" name="Picture 2" descr="C:\Users\Usuario\Downloads\Diagrama ARQ gral.JPG"/>
+          <p:cNvPicPr>
+            <a:picLocks noChangeAspect="1" noChangeArrowheads="1"/>
+          </p:cNvPicPr>
+          <p:nvPr/>
+        </p:nvPicPr>
+        <p:blipFill>
+          <a:blip r:embed="rId2">
+            <a:extLst>
+              <a:ext uri="{28A0092B-C50C-407E-A947-70E740481C1C}">
+                <a14:useLocalDpi xmlns:a14="http://schemas.microsoft.com/office/drawing/2010/main" val="0"/>
+              </a:ext>
+            </a:extLst>
+          </a:blip>
+          <a:srcRect/>
+          <a:stretch>
+            <a:fillRect/>
+          </a:stretch>
+        </p:blipFill>
+        <p:spPr bwMode="auto">
+          <a:xfrm>
+            <a:off x="611560" y="2564880"/>
+            <a:ext cx="7791450" cy="4032250"/>
+          </a:xfrm>
+          <a:prstGeom prst="rect">
+            <a:avLst/>
+          </a:prstGeom>
+          <a:noFill/>
+          <a:extLst>
+            <a:ext uri="{909E8E84-426E-40DD-AFC4-6F175D3DCCD1}">
+              <a14:hiddenFill xmlns:a14="http://schemas.microsoft.com/office/drawing/2010/main">
+                <a:solidFill>
+                  <a:srgbClr val="FFFFFF"/>
+                </a:solidFill>
+              </a14:hiddenFill>
+            </a:ext>
+          </a:extLst>
+        </p:spPr>
+      </p:pic>
     </p:spTree>
     <p:extLst>
       <p:ext uri="{BB962C8B-B14F-4D97-AF65-F5344CB8AC3E}">
-        <p14:creationId xmlns:p14="http://schemas.microsoft.com/office/powerpoint/2010/main" val="3692219147"/>
+        <p14:creationId xmlns:p14="http://schemas.microsoft.com/office/powerpoint/2010/main" val="987346929"/>
       </p:ext>
     </p:extLst>
   </p:cSld>
@@ -5714,7 +5501,7 @@
           <a:p>
             <a:r>
               <a:rPr lang="es-AR" dirty="0" smtClean="0"/>
-              <a:t>Arquitectura</a:t>
+              <a:t>Arquitectura	</a:t>
             </a:r>
             <a:endParaRPr lang="es-ES" dirty="0"/>
           </a:p>
@@ -5730,69 +5517,889 @@
             <p:ph idx="1"/>
           </p:nvPr>
         </p:nvSpPr>
-        <p:spPr>
-          <a:xfrm>
-            <a:off x="457200" y="1412776"/>
-            <a:ext cx="8229600" cy="5042032"/>
-          </a:xfrm>
-        </p:spPr>
-        <p:txBody>
-          <a:bodyPr/>
+        <p:spPr/>
+        <p:txBody>
+          <a:bodyPr>
+            <a:normAutofit fontScale="92500" lnSpcReduction="10000"/>
+          </a:bodyPr>
           <a:lstStyle/>
           <a:p>
-            <a:r>
-              <a:rPr lang="es-AR" dirty="0" smtClean="0"/>
-              <a:t>Acorde a los requerimientos y casos de uso</a:t>
-            </a:r>
+            <a:pPr>
+              <a:lnSpc>
+                <a:spcPct val="100000"/>
+              </a:lnSpc>
+            </a:pPr>
+            <a:r>
+              <a:rPr lang="en-US" sz="3200" b="1" spc="-1" dirty="0">
+                <a:uFill>
+                  <a:solidFill>
+                    <a:srgbClr val="FFFFFF"/>
+                  </a:solidFill>
+                </a:uFill>
+                <a:latin typeface="Corbel"/>
+              </a:rPr>
+              <a:t>Se ha </a:t>
+            </a:r>
+            <a:r>
+              <a:rPr lang="en-US" sz="3200" b="1" spc="-1" dirty="0" err="1">
+                <a:uFill>
+                  <a:solidFill>
+                    <a:srgbClr val="FFFFFF"/>
+                  </a:solidFill>
+                </a:uFill>
+                <a:latin typeface="Corbel"/>
+              </a:rPr>
+              <a:t>utilizado</a:t>
+            </a:r>
+            <a:r>
+              <a:rPr lang="en-US" sz="3200" b="1" spc="-1" dirty="0">
+                <a:uFill>
+                  <a:solidFill>
+                    <a:srgbClr val="FFFFFF"/>
+                  </a:solidFill>
+                </a:uFill>
+                <a:latin typeface="Corbel"/>
+              </a:rPr>
+              <a:t> el </a:t>
+            </a:r>
+            <a:r>
+              <a:rPr lang="en-US" sz="3200" b="1" spc="-1" dirty="0" err="1">
+                <a:uFill>
+                  <a:solidFill>
+                    <a:srgbClr val="FFFFFF"/>
+                  </a:solidFill>
+                </a:uFill>
+                <a:latin typeface="Corbel"/>
+              </a:rPr>
+              <a:t>patrón</a:t>
+            </a:r>
+            <a:r>
+              <a:rPr lang="en-US" sz="3200" b="1" spc="-1" dirty="0">
+                <a:uFill>
+                  <a:solidFill>
+                    <a:srgbClr val="FFFFFF"/>
+                  </a:solidFill>
+                </a:uFill>
+                <a:latin typeface="Corbel"/>
+              </a:rPr>
+              <a:t> de </a:t>
+            </a:r>
+            <a:r>
+              <a:rPr lang="en-US" sz="3200" b="1" spc="-1" dirty="0" err="1">
+                <a:uFill>
+                  <a:solidFill>
+                    <a:srgbClr val="FFFFFF"/>
+                  </a:solidFill>
+                </a:uFill>
+                <a:latin typeface="Corbel"/>
+              </a:rPr>
+              <a:t>arquitectura</a:t>
+            </a:r>
+            <a:r>
+              <a:rPr lang="en-US" sz="3200" b="1" spc="-1" dirty="0">
+                <a:uFill>
+                  <a:solidFill>
+                    <a:srgbClr val="FFFFFF"/>
+                  </a:solidFill>
+                </a:uFill>
+                <a:latin typeface="Corbel"/>
+              </a:rPr>
+              <a:t> MVC </a:t>
+            </a:r>
+            <a:r>
+              <a:rPr lang="en-US" sz="3200" b="1" spc="-1" dirty="0" err="1">
+                <a:uFill>
+                  <a:solidFill>
+                    <a:srgbClr val="FFFFFF"/>
+                  </a:solidFill>
+                </a:uFill>
+                <a:latin typeface="Corbel"/>
+              </a:rPr>
+              <a:t>ya</a:t>
+            </a:r>
+            <a:r>
+              <a:rPr lang="en-US" sz="3200" b="1" spc="-1" dirty="0">
+                <a:uFill>
+                  <a:solidFill>
+                    <a:srgbClr val="FFFFFF"/>
+                  </a:solidFill>
+                </a:uFill>
+                <a:latin typeface="Corbel"/>
+              </a:rPr>
+              <a:t> que </a:t>
+            </a:r>
+            <a:r>
+              <a:rPr lang="en-US" sz="3200" b="1" spc="-1" dirty="0" err="1">
+                <a:uFill>
+                  <a:solidFill>
+                    <a:srgbClr val="FFFFFF"/>
+                  </a:solidFill>
+                </a:uFill>
+                <a:latin typeface="Corbel"/>
+              </a:rPr>
+              <a:t>brinda</a:t>
+            </a:r>
+            <a:r>
+              <a:rPr lang="en-US" sz="3200" b="1" spc="-1" dirty="0">
+                <a:uFill>
+                  <a:solidFill>
+                    <a:srgbClr val="FFFFFF"/>
+                  </a:solidFill>
+                </a:uFill>
+                <a:latin typeface="Corbel"/>
+              </a:rPr>
+              <a:t> al </a:t>
+            </a:r>
+            <a:r>
+              <a:rPr lang="en-US" sz="3200" b="1" spc="-1" dirty="0" err="1">
+                <a:uFill>
+                  <a:solidFill>
+                    <a:srgbClr val="FFFFFF"/>
+                  </a:solidFill>
+                </a:uFill>
+                <a:latin typeface="Corbel"/>
+              </a:rPr>
+              <a:t>proyecto</a:t>
+            </a:r>
+            <a:r>
+              <a:rPr lang="en-US" sz="3200" b="1" spc="-1" dirty="0">
+                <a:uFill>
+                  <a:solidFill>
+                    <a:srgbClr val="FFFFFF"/>
+                  </a:solidFill>
+                </a:uFill>
+                <a:latin typeface="Corbel"/>
+              </a:rPr>
+              <a:t> </a:t>
+            </a:r>
+            <a:r>
+              <a:rPr lang="en-US" sz="3200" b="1" spc="-1" dirty="0" err="1">
+                <a:uFill>
+                  <a:solidFill>
+                    <a:srgbClr val="FFFFFF"/>
+                  </a:solidFill>
+                </a:uFill>
+                <a:latin typeface="Corbel"/>
+              </a:rPr>
+              <a:t>distintas</a:t>
+            </a:r>
+            <a:r>
+              <a:rPr lang="en-US" sz="3200" b="1" spc="-1" dirty="0">
+                <a:uFill>
+                  <a:solidFill>
+                    <a:srgbClr val="FFFFFF"/>
+                  </a:solidFill>
+                </a:uFill>
+                <a:latin typeface="Corbel"/>
+              </a:rPr>
+              <a:t> </a:t>
+            </a:r>
+            <a:r>
+              <a:rPr lang="en-US" sz="3200" b="1" spc="-1" dirty="0" err="1">
+                <a:uFill>
+                  <a:solidFill>
+                    <a:srgbClr val="FFFFFF"/>
+                  </a:solidFill>
+                </a:uFill>
+                <a:latin typeface="Corbel"/>
+              </a:rPr>
+              <a:t>ventajas</a:t>
+            </a:r>
+            <a:r>
+              <a:rPr lang="en-US" sz="3200" b="1" spc="-1" dirty="0">
+                <a:uFill>
+                  <a:solidFill>
+                    <a:srgbClr val="FFFFFF"/>
+                  </a:solidFill>
+                </a:uFill>
+                <a:latin typeface="Corbel"/>
+              </a:rPr>
+              <a:t> que </a:t>
+            </a:r>
+            <a:r>
+              <a:rPr lang="en-US" sz="3200" b="1" spc="-1" dirty="0" err="1">
+                <a:uFill>
+                  <a:solidFill>
+                    <a:srgbClr val="FFFFFF"/>
+                  </a:solidFill>
+                </a:uFill>
+                <a:latin typeface="Corbel"/>
+              </a:rPr>
+              <a:t>justifican</a:t>
+            </a:r>
+            <a:r>
+              <a:rPr lang="en-US" sz="3200" b="1" spc="-1" dirty="0">
+                <a:uFill>
+                  <a:solidFill>
+                    <a:srgbClr val="FFFFFF"/>
+                  </a:solidFill>
+                </a:uFill>
+                <a:latin typeface="Corbel"/>
+              </a:rPr>
+              <a:t> </a:t>
+            </a:r>
+            <a:r>
+              <a:rPr lang="en-US" sz="3200" b="1" spc="-1" dirty="0" err="1">
+                <a:uFill>
+                  <a:solidFill>
+                    <a:srgbClr val="FFFFFF"/>
+                  </a:solidFill>
+                </a:uFill>
+                <a:latin typeface="Corbel"/>
+              </a:rPr>
+              <a:t>su</a:t>
+            </a:r>
+            <a:r>
+              <a:rPr lang="en-US" sz="3200" b="1" spc="-1" dirty="0">
+                <a:uFill>
+                  <a:solidFill>
+                    <a:srgbClr val="FFFFFF"/>
+                  </a:solidFill>
+                </a:uFill>
+                <a:latin typeface="Corbel"/>
+              </a:rPr>
+              <a:t> </a:t>
+            </a:r>
+            <a:r>
+              <a:rPr lang="en-US" sz="3200" b="1" spc="-1" dirty="0" err="1">
+                <a:uFill>
+                  <a:solidFill>
+                    <a:srgbClr val="FFFFFF"/>
+                  </a:solidFill>
+                </a:uFill>
+                <a:latin typeface="Corbel"/>
+              </a:rPr>
+              <a:t>aplicación</a:t>
+            </a:r>
+            <a:r>
+              <a:rPr lang="en-US" sz="3200" spc="-1" dirty="0">
+                <a:uFill>
+                  <a:solidFill>
+                    <a:srgbClr val="FFFFFF"/>
+                  </a:solidFill>
+                </a:uFill>
+                <a:latin typeface="Corbel"/>
+              </a:rPr>
+              <a:t>:</a:t>
+            </a:r>
+          </a:p>
+          <a:p>
+            <a:pPr marL="228600" indent="-228240">
+              <a:lnSpc>
+                <a:spcPct val="90000"/>
+              </a:lnSpc>
+              <a:buClr>
+                <a:srgbClr val="FFFFFF"/>
+              </a:buClr>
+              <a:buFont typeface="Arial"/>
+              <a:buChar char="•"/>
+            </a:pPr>
+            <a:r>
+              <a:rPr lang="en-US" sz="3200" spc="-1" dirty="0" err="1">
+                <a:uFill>
+                  <a:solidFill>
+                    <a:srgbClr val="FFFFFF"/>
+                  </a:solidFill>
+                </a:uFill>
+                <a:latin typeface="Corbel"/>
+              </a:rPr>
+              <a:t>Proporciona</a:t>
+            </a:r>
+            <a:r>
+              <a:rPr lang="en-US" sz="3200" spc="-1" dirty="0">
+                <a:uFill>
+                  <a:solidFill>
+                    <a:srgbClr val="FFFFFF"/>
+                  </a:solidFill>
+                </a:uFill>
+                <a:latin typeface="Corbel"/>
+              </a:rPr>
+              <a:t> </a:t>
+            </a:r>
+            <a:r>
+              <a:rPr lang="en-US" sz="3200" spc="-1" dirty="0" err="1">
+                <a:uFill>
+                  <a:solidFill>
+                    <a:srgbClr val="FFFFFF"/>
+                  </a:solidFill>
+                </a:uFill>
+                <a:latin typeface="Corbel"/>
+              </a:rPr>
+              <a:t>mantenibilidad</a:t>
+            </a:r>
+            <a:r>
+              <a:rPr lang="en-US" sz="3200" spc="-1" dirty="0">
+                <a:uFill>
+                  <a:solidFill>
+                    <a:srgbClr val="FFFFFF"/>
+                  </a:solidFill>
+                </a:uFill>
+                <a:latin typeface="Corbel"/>
+              </a:rPr>
+              <a:t>, se </a:t>
+            </a:r>
+            <a:r>
+              <a:rPr lang="en-US" sz="3200" spc="-1" dirty="0" err="1">
+                <a:uFill>
+                  <a:solidFill>
+                    <a:srgbClr val="FFFFFF"/>
+                  </a:solidFill>
+                </a:uFill>
+                <a:latin typeface="Corbel"/>
+              </a:rPr>
+              <a:t>tiene</a:t>
+            </a:r>
+            <a:r>
+              <a:rPr lang="en-US" sz="3200" spc="-1" dirty="0">
+                <a:uFill>
+                  <a:solidFill>
+                    <a:srgbClr val="FFFFFF"/>
+                  </a:solidFill>
+                </a:uFill>
+                <a:latin typeface="Corbel"/>
+              </a:rPr>
+              <a:t> un </a:t>
+            </a:r>
+            <a:r>
+              <a:rPr lang="en-US" sz="3200" spc="-1" dirty="0" err="1">
+                <a:uFill>
+                  <a:solidFill>
+                    <a:srgbClr val="FFFFFF"/>
+                  </a:solidFill>
+                </a:uFill>
+                <a:latin typeface="Corbel"/>
+              </a:rPr>
+              <a:t>código</a:t>
+            </a:r>
+            <a:r>
+              <a:rPr lang="en-US" sz="3200" spc="-1" dirty="0">
+                <a:uFill>
+                  <a:solidFill>
+                    <a:srgbClr val="FFFFFF"/>
+                  </a:solidFill>
+                </a:uFill>
+                <a:latin typeface="Corbel"/>
+              </a:rPr>
+              <a:t> </a:t>
+            </a:r>
+            <a:r>
+              <a:rPr lang="en-US" sz="3200" spc="-1" dirty="0" err="1">
+                <a:uFill>
+                  <a:solidFill>
+                    <a:srgbClr val="FFFFFF"/>
+                  </a:solidFill>
+                </a:uFill>
+                <a:latin typeface="Corbel"/>
+              </a:rPr>
+              <a:t>más</a:t>
+            </a:r>
+            <a:r>
+              <a:rPr lang="en-US" sz="3200" spc="-1" dirty="0">
+                <a:uFill>
+                  <a:solidFill>
+                    <a:srgbClr val="FFFFFF"/>
+                  </a:solidFill>
+                </a:uFill>
+                <a:latin typeface="Corbel"/>
+              </a:rPr>
+              <a:t> </a:t>
+            </a:r>
+            <a:r>
+              <a:rPr lang="en-US" sz="3200" spc="-1" dirty="0" err="1">
+                <a:uFill>
+                  <a:solidFill>
+                    <a:srgbClr val="FFFFFF"/>
+                  </a:solidFill>
+                </a:uFill>
+                <a:latin typeface="Corbel"/>
+              </a:rPr>
+              <a:t>fácil</a:t>
+            </a:r>
+            <a:r>
+              <a:rPr lang="en-US" sz="3200" spc="-1" dirty="0">
+                <a:uFill>
+                  <a:solidFill>
+                    <a:srgbClr val="FFFFFF"/>
+                  </a:solidFill>
+                </a:uFill>
+                <a:latin typeface="Corbel"/>
+              </a:rPr>
+              <a:t> de leer y </a:t>
+            </a:r>
+            <a:r>
+              <a:rPr lang="en-US" sz="3200" spc="-1" dirty="0" err="1">
+                <a:uFill>
+                  <a:solidFill>
+                    <a:srgbClr val="FFFFFF"/>
+                  </a:solidFill>
+                </a:uFill>
+                <a:latin typeface="Corbel"/>
+              </a:rPr>
+              <a:t>modificar</a:t>
+            </a:r>
+            <a:r>
+              <a:rPr lang="en-US" sz="3200" spc="-1" dirty="0">
+                <a:uFill>
+                  <a:solidFill>
+                    <a:srgbClr val="FFFFFF"/>
+                  </a:solidFill>
+                </a:uFill>
+                <a:latin typeface="Corbel"/>
+              </a:rPr>
+              <a:t>, </a:t>
+            </a:r>
+            <a:r>
+              <a:rPr lang="en-US" sz="3200" spc="-1" dirty="0" err="1">
+                <a:uFill>
+                  <a:solidFill>
+                    <a:srgbClr val="FFFFFF"/>
+                  </a:solidFill>
+                </a:uFill>
+                <a:latin typeface="Corbel"/>
+              </a:rPr>
+              <a:t>acomodándose</a:t>
+            </a:r>
+            <a:r>
+              <a:rPr lang="en-US" sz="3200" spc="-1" dirty="0">
+                <a:uFill>
+                  <a:solidFill>
+                    <a:srgbClr val="FFFFFF"/>
+                  </a:solidFill>
+                </a:uFill>
+                <a:latin typeface="Corbel"/>
+              </a:rPr>
+              <a:t> </a:t>
+            </a:r>
+            <a:r>
+              <a:rPr lang="en-US" sz="3200" spc="-1" dirty="0" err="1">
+                <a:uFill>
+                  <a:solidFill>
+                    <a:srgbClr val="FFFFFF"/>
+                  </a:solidFill>
+                </a:uFill>
+                <a:latin typeface="Corbel"/>
+              </a:rPr>
+              <a:t>mejor</a:t>
+            </a:r>
+            <a:r>
+              <a:rPr lang="en-US" sz="3200" spc="-1" dirty="0">
+                <a:uFill>
+                  <a:solidFill>
+                    <a:srgbClr val="FFFFFF"/>
+                  </a:solidFill>
+                </a:uFill>
+                <a:latin typeface="Corbel"/>
+              </a:rPr>
+              <a:t> para </a:t>
+            </a:r>
+            <a:r>
+              <a:rPr lang="en-US" sz="3200" spc="-1" dirty="0" err="1">
+                <a:uFill>
+                  <a:solidFill>
+                    <a:srgbClr val="FFFFFF"/>
+                  </a:solidFill>
+                </a:uFill>
+                <a:latin typeface="Corbel"/>
+              </a:rPr>
+              <a:t>cambios</a:t>
+            </a:r>
+            <a:r>
+              <a:rPr lang="en-US" sz="3200" spc="-1" dirty="0">
+                <a:uFill>
+                  <a:solidFill>
+                    <a:srgbClr val="FFFFFF"/>
+                  </a:solidFill>
+                </a:uFill>
+                <a:latin typeface="Corbel"/>
+              </a:rPr>
+              <a:t> </a:t>
+            </a:r>
+            <a:r>
+              <a:rPr lang="en-US" sz="3200" spc="-1" dirty="0" err="1">
+                <a:uFill>
+                  <a:solidFill>
+                    <a:srgbClr val="FFFFFF"/>
+                  </a:solidFill>
+                </a:uFill>
+                <a:latin typeface="Corbel"/>
+              </a:rPr>
+              <a:t>futuros</a:t>
+            </a:r>
+            <a:r>
+              <a:rPr lang="en-US" sz="3200" spc="-1" dirty="0">
+                <a:uFill>
+                  <a:solidFill>
+                    <a:srgbClr val="FFFFFF"/>
+                  </a:solidFill>
+                </a:uFill>
+                <a:latin typeface="Corbel"/>
+              </a:rPr>
+              <a:t>.</a:t>
+            </a:r>
+          </a:p>
+          <a:p>
+            <a:pPr marL="228600" indent="-228240">
+              <a:lnSpc>
+                <a:spcPct val="90000"/>
+              </a:lnSpc>
+              <a:buClr>
+                <a:srgbClr val="FFFFFF"/>
+              </a:buClr>
+              <a:buFont typeface="Arial"/>
+              <a:buChar char="•"/>
+            </a:pPr>
+            <a:r>
+              <a:rPr lang="en-US" sz="3200" spc="-1" dirty="0" err="1">
+                <a:uFill>
+                  <a:solidFill>
+                    <a:srgbClr val="FFFFFF"/>
+                  </a:solidFill>
+                </a:uFill>
+                <a:latin typeface="Corbel"/>
+              </a:rPr>
+              <a:t>Independencia</a:t>
+            </a:r>
+            <a:r>
+              <a:rPr lang="en-US" sz="3200" spc="-1" dirty="0">
+                <a:uFill>
+                  <a:solidFill>
+                    <a:srgbClr val="FFFFFF"/>
+                  </a:solidFill>
+                </a:uFill>
+                <a:latin typeface="Corbel"/>
+              </a:rPr>
+              <a:t> de ‘</a:t>
+            </a:r>
+            <a:r>
+              <a:rPr lang="en-US" sz="3200" spc="-1" dirty="0" err="1">
+                <a:uFill>
+                  <a:solidFill>
+                    <a:srgbClr val="FFFFFF"/>
+                  </a:solidFill>
+                </a:uFill>
+                <a:latin typeface="Corbel"/>
+              </a:rPr>
+              <a:t>capas</a:t>
+            </a:r>
+            <a:r>
+              <a:rPr lang="en-US" sz="3200" spc="-1" dirty="0">
+                <a:uFill>
+                  <a:solidFill>
+                    <a:srgbClr val="FFFFFF"/>
+                  </a:solidFill>
+                </a:uFill>
+                <a:latin typeface="Corbel"/>
+              </a:rPr>
+              <a:t>’, lo que </a:t>
+            </a:r>
+            <a:r>
+              <a:rPr lang="en-US" sz="3200" spc="-1" dirty="0" err="1">
+                <a:uFill>
+                  <a:solidFill>
+                    <a:srgbClr val="FFFFFF"/>
+                  </a:solidFill>
+                </a:uFill>
+                <a:latin typeface="Corbel"/>
+              </a:rPr>
+              <a:t>proporciona</a:t>
+            </a:r>
+            <a:r>
+              <a:rPr lang="en-US" sz="3200" spc="-1" dirty="0">
+                <a:uFill>
+                  <a:solidFill>
+                    <a:srgbClr val="FFFFFF"/>
+                  </a:solidFill>
+                </a:uFill>
+                <a:latin typeface="Corbel"/>
+              </a:rPr>
+              <a:t> la </a:t>
+            </a:r>
+            <a:r>
+              <a:rPr lang="en-US" sz="3200" spc="-1" dirty="0" err="1">
+                <a:uFill>
+                  <a:solidFill>
+                    <a:srgbClr val="FFFFFF"/>
+                  </a:solidFill>
+                </a:uFill>
+                <a:latin typeface="Corbel"/>
+              </a:rPr>
+              <a:t>habilidad</a:t>
+            </a:r>
+            <a:r>
+              <a:rPr lang="en-US" sz="3200" spc="-1" dirty="0">
+                <a:uFill>
+                  <a:solidFill>
+                    <a:srgbClr val="FFFFFF"/>
+                  </a:solidFill>
+                </a:uFill>
+                <a:latin typeface="Corbel"/>
+              </a:rPr>
+              <a:t> de </a:t>
+            </a:r>
+            <a:r>
+              <a:rPr lang="en-US" sz="3200" spc="-1" dirty="0" err="1">
+                <a:uFill>
+                  <a:solidFill>
+                    <a:srgbClr val="FFFFFF"/>
+                  </a:solidFill>
+                </a:uFill>
+                <a:latin typeface="Corbel"/>
+              </a:rPr>
+              <a:t>cambiar</a:t>
+            </a:r>
+            <a:r>
+              <a:rPr lang="en-US" sz="3200" spc="-1" dirty="0">
+                <a:uFill>
+                  <a:solidFill>
+                    <a:srgbClr val="FFFFFF"/>
+                  </a:solidFill>
+                </a:uFill>
+                <a:latin typeface="Corbel"/>
+              </a:rPr>
+              <a:t> la </a:t>
+            </a:r>
+            <a:r>
+              <a:rPr lang="en-US" sz="3200" spc="-1" dirty="0" err="1">
+                <a:uFill>
+                  <a:solidFill>
+                    <a:srgbClr val="FFFFFF"/>
+                  </a:solidFill>
+                </a:uFill>
+                <a:latin typeface="Corbel"/>
+              </a:rPr>
+              <a:t>implementación</a:t>
+            </a:r>
+            <a:r>
+              <a:rPr lang="en-US" sz="3200" spc="-1" dirty="0">
+                <a:uFill>
+                  <a:solidFill>
+                    <a:srgbClr val="FFFFFF"/>
+                  </a:solidFill>
+                </a:uFill>
+                <a:latin typeface="Corbel"/>
+              </a:rPr>
+              <a:t> de un </a:t>
+            </a:r>
+            <a:r>
+              <a:rPr lang="en-US" sz="3200" spc="-1" dirty="0" err="1">
+                <a:uFill>
+                  <a:solidFill>
+                    <a:srgbClr val="FFFFFF"/>
+                  </a:solidFill>
+                </a:uFill>
+                <a:latin typeface="Corbel"/>
+              </a:rPr>
+              <a:t>modelo</a:t>
+            </a:r>
+            <a:r>
+              <a:rPr lang="en-US" sz="3200" spc="-1" dirty="0">
+                <a:uFill>
+                  <a:solidFill>
+                    <a:srgbClr val="FFFFFF"/>
+                  </a:solidFill>
+                </a:uFill>
+                <a:latin typeface="Corbel"/>
+              </a:rPr>
+              <a:t> a </a:t>
+            </a:r>
+            <a:r>
+              <a:rPr lang="en-US" sz="3200" spc="-1" dirty="0" err="1">
+                <a:uFill>
+                  <a:solidFill>
+                    <a:srgbClr val="FFFFFF"/>
+                  </a:solidFill>
+                </a:uFill>
+                <a:latin typeface="Corbel"/>
+              </a:rPr>
+              <a:t>otro</a:t>
+            </a:r>
+            <a:r>
+              <a:rPr lang="en-US" sz="3200" spc="-1" dirty="0">
+                <a:uFill>
+                  <a:solidFill>
+                    <a:srgbClr val="FFFFFF"/>
+                  </a:solidFill>
+                </a:uFill>
+                <a:latin typeface="Corbel"/>
+              </a:rPr>
+              <a:t>.</a:t>
+            </a:r>
+          </a:p>
+          <a:p>
+            <a:pPr marL="228600" indent="-228240">
+              <a:lnSpc>
+                <a:spcPct val="90000"/>
+              </a:lnSpc>
+              <a:buClr>
+                <a:srgbClr val="FFFFFF"/>
+              </a:buClr>
+              <a:buFont typeface="Arial"/>
+              <a:buChar char="•"/>
+            </a:pPr>
+            <a:r>
+              <a:rPr lang="en-US" sz="3200" spc="-1" dirty="0" err="1">
+                <a:uFill>
+                  <a:solidFill>
+                    <a:srgbClr val="FFFFFF"/>
+                  </a:solidFill>
+                </a:uFill>
+                <a:latin typeface="Corbel"/>
+              </a:rPr>
+              <a:t>Facilita</a:t>
+            </a:r>
+            <a:r>
+              <a:rPr lang="en-US" sz="3200" spc="-1" dirty="0">
+                <a:uFill>
+                  <a:solidFill>
+                    <a:srgbClr val="FFFFFF"/>
+                  </a:solidFill>
+                </a:uFill>
+                <a:latin typeface="Corbel"/>
+              </a:rPr>
+              <a:t> el </a:t>
+            </a:r>
+            <a:r>
+              <a:rPr lang="en-US" sz="3200" spc="-1" dirty="0" err="1">
+                <a:uFill>
+                  <a:solidFill>
+                    <a:srgbClr val="FFFFFF"/>
+                  </a:solidFill>
+                </a:uFill>
+                <a:latin typeface="Corbel"/>
+              </a:rPr>
+              <a:t>uso</a:t>
+            </a:r>
+            <a:r>
+              <a:rPr lang="en-US" sz="3200" spc="-1" dirty="0">
+                <a:uFill>
+                  <a:solidFill>
+                    <a:srgbClr val="FFFFFF"/>
+                  </a:solidFill>
+                </a:uFill>
+                <a:latin typeface="Corbel"/>
+              </a:rPr>
+              <a:t> de Unit Testing al </a:t>
+            </a:r>
+            <a:r>
+              <a:rPr lang="en-US" sz="3200" spc="-1" dirty="0" err="1">
+                <a:uFill>
+                  <a:solidFill>
+                    <a:srgbClr val="FFFFFF"/>
+                  </a:solidFill>
+                </a:uFill>
+                <a:latin typeface="Corbel"/>
+              </a:rPr>
+              <a:t>dividir</a:t>
+            </a:r>
+            <a:r>
+              <a:rPr lang="en-US" sz="3200" spc="-1" dirty="0">
+                <a:uFill>
+                  <a:solidFill>
+                    <a:srgbClr val="FFFFFF"/>
+                  </a:solidFill>
+                </a:uFill>
+                <a:latin typeface="Corbel"/>
+              </a:rPr>
+              <a:t> al </a:t>
+            </a:r>
+            <a:r>
+              <a:rPr lang="en-US" sz="3200" spc="-1" dirty="0" err="1">
+                <a:uFill>
+                  <a:solidFill>
+                    <a:srgbClr val="FFFFFF"/>
+                  </a:solidFill>
+                </a:uFill>
+                <a:latin typeface="Corbel"/>
+              </a:rPr>
+              <a:t>sistema</a:t>
+            </a:r>
+            <a:r>
+              <a:rPr lang="en-US" sz="3200" spc="-1" dirty="0">
+                <a:uFill>
+                  <a:solidFill>
+                    <a:srgbClr val="FFFFFF"/>
+                  </a:solidFill>
+                </a:uFill>
+                <a:latin typeface="Corbel"/>
+              </a:rPr>
+              <a:t> </a:t>
+            </a:r>
+            <a:r>
+              <a:rPr lang="en-US" sz="3200" spc="-1" dirty="0" err="1">
+                <a:uFill>
+                  <a:solidFill>
+                    <a:srgbClr val="FFFFFF"/>
+                  </a:solidFill>
+                </a:uFill>
+                <a:latin typeface="Corbel"/>
+              </a:rPr>
+              <a:t>en</a:t>
+            </a:r>
+            <a:r>
+              <a:rPr lang="en-US" sz="3200" spc="-1" dirty="0">
+                <a:uFill>
+                  <a:solidFill>
+                    <a:srgbClr val="FFFFFF"/>
+                  </a:solidFill>
+                </a:uFill>
+                <a:latin typeface="Corbel"/>
+              </a:rPr>
+              <a:t> </a:t>
+            </a:r>
+            <a:r>
+              <a:rPr lang="en-US" sz="3200" spc="-1" dirty="0" err="1">
+                <a:uFill>
+                  <a:solidFill>
+                    <a:srgbClr val="FFFFFF"/>
+                  </a:solidFill>
+                </a:uFill>
+                <a:latin typeface="Corbel"/>
+              </a:rPr>
+              <a:t>tres</a:t>
+            </a:r>
+            <a:r>
+              <a:rPr lang="en-US" sz="3200" spc="-1" dirty="0">
+                <a:uFill>
+                  <a:solidFill>
+                    <a:srgbClr val="FFFFFF"/>
+                  </a:solidFill>
+                </a:uFill>
+                <a:latin typeface="Corbel"/>
+              </a:rPr>
+              <a:t> </a:t>
+            </a:r>
+            <a:r>
+              <a:rPr lang="en-US" sz="3200" spc="-1" dirty="0" err="1">
+                <a:uFill>
+                  <a:solidFill>
+                    <a:srgbClr val="FFFFFF"/>
+                  </a:solidFill>
+                </a:uFill>
+                <a:latin typeface="Corbel"/>
+              </a:rPr>
+              <a:t>piezas</a:t>
+            </a:r>
+            <a:r>
+              <a:rPr lang="en-US" sz="3200" spc="-1" dirty="0">
+                <a:uFill>
+                  <a:solidFill>
+                    <a:srgbClr val="FFFFFF"/>
+                  </a:solidFill>
+                </a:uFill>
+                <a:latin typeface="Corbel"/>
+              </a:rPr>
+              <a:t>.</a:t>
+            </a:r>
+          </a:p>
+          <a:p>
             <a:endParaRPr lang="es-ES" dirty="0"/>
           </a:p>
         </p:txBody>
       </p:sp>
-      <p:pic>
-        <p:nvPicPr>
-          <p:cNvPr id="4" name="Picture 2" descr="C:\Users\Usuario\Downloads\Diagrama ARQ preliminar.JPG"/>
-          <p:cNvPicPr>
-            <a:picLocks noChangeAspect="1" noChangeArrowheads="1"/>
-          </p:cNvPicPr>
-          <p:nvPr/>
-        </p:nvPicPr>
-        <p:blipFill>
-          <a:blip r:embed="rId2">
-            <a:extLst>
-              <a:ext uri="{28A0092B-C50C-407E-A947-70E740481C1C}">
-                <a14:useLocalDpi xmlns:a14="http://schemas.microsoft.com/office/drawing/2010/main" val="0"/>
-              </a:ext>
-            </a:extLst>
-          </a:blip>
-          <a:srcRect/>
-          <a:stretch>
-            <a:fillRect/>
-          </a:stretch>
-        </p:blipFill>
-        <p:spPr bwMode="auto">
-          <a:xfrm>
-            <a:off x="827584" y="2492896"/>
-            <a:ext cx="7956376" cy="4069104"/>
-          </a:xfrm>
-          <a:prstGeom prst="rect">
-            <a:avLst/>
-          </a:prstGeom>
-          <a:noFill/>
-          <a:extLst>
-            <a:ext uri="{909E8E84-426E-40DD-AFC4-6F175D3DCCD1}">
-              <a14:hiddenFill xmlns:a14="http://schemas.microsoft.com/office/drawing/2010/main">
-                <a:solidFill>
-                  <a:srgbClr val="FFFFFF"/>
-                </a:solidFill>
-              </a14:hiddenFill>
-            </a:ext>
-          </a:extLst>
-        </p:spPr>
-      </p:pic>
     </p:spTree>
     <p:extLst>
       <p:ext uri="{BB962C8B-B14F-4D97-AF65-F5344CB8AC3E}">
-        <p14:creationId xmlns:p14="http://schemas.microsoft.com/office/powerpoint/2010/main" val="7042049"/>
+        <p14:creationId xmlns:p14="http://schemas.microsoft.com/office/powerpoint/2010/main" val="3692219147"/>
       </p:ext>
     </p:extLst>
   </p:cSld>
@@ -5854,8 +6461,8 @@
         </p:nvSpPr>
         <p:spPr>
           <a:xfrm>
-            <a:off x="457200" y="1484784"/>
-            <a:ext cx="8229600" cy="4970024"/>
+            <a:off x="457200" y="1412776"/>
+            <a:ext cx="8229600" cy="5042032"/>
           </a:xfrm>
         </p:spPr>
         <p:txBody>
@@ -5864,15 +6471,7 @@
           <a:p>
             <a:r>
               <a:rPr lang="es-AR" dirty="0" smtClean="0"/>
-              <a:t>Diagrama de despliegue : </a:t>
-            </a:r>
-            <a:r>
-              <a:rPr lang="es-AR" dirty="0" smtClean="0"/>
-              <a:t>implementación </a:t>
-            </a:r>
-            <a:r>
-              <a:rPr lang="es-AR" dirty="0" smtClean="0"/>
-              <a:t>ideal del sistema</a:t>
+              <a:t>Acorde a los requerimientos y casos de uso</a:t>
             </a:r>
             <a:endParaRPr lang="es-ES" dirty="0"/>
           </a:p>
@@ -5880,7 +6479,7 @@
       </p:sp>
       <p:pic>
         <p:nvPicPr>
-          <p:cNvPr id="3074" name="Picture 2" descr="C:\Users\Usuario\Downloads\diagrama despliegue.JPG"/>
+          <p:cNvPr id="4" name="Picture 2" descr="C:\Users\Usuario\Downloads\Diagrama ARQ preliminar.JPG"/>
           <p:cNvPicPr>
             <a:picLocks noChangeAspect="1" noChangeArrowheads="1"/>
           </p:cNvPicPr>
@@ -5901,8 +6500,8 @@
         </p:blipFill>
         <p:spPr bwMode="auto">
           <a:xfrm>
-            <a:off x="1403648" y="2708920"/>
-            <a:ext cx="6552728" cy="3703716"/>
+            <a:off x="827584" y="2492896"/>
+            <a:ext cx="7956376" cy="4069104"/>
           </a:xfrm>
           <a:prstGeom prst="rect">
             <a:avLst/>
@@ -5922,7 +6521,7 @@
     </p:spTree>
     <p:extLst>
       <p:ext uri="{BB962C8B-B14F-4D97-AF65-F5344CB8AC3E}">
-        <p14:creationId xmlns:p14="http://schemas.microsoft.com/office/powerpoint/2010/main" val="2775794953"/>
+        <p14:creationId xmlns:p14="http://schemas.microsoft.com/office/powerpoint/2010/main" val="7042049"/>
       </p:ext>
     </p:extLst>
   </p:cSld>
@@ -5966,7 +6565,7 @@
           <a:p>
             <a:r>
               <a:rPr lang="es-AR" dirty="0" smtClean="0"/>
-              <a:t>Diseño	</a:t>
+              <a:t>Arquitectura</a:t>
             </a:r>
             <a:endParaRPr lang="es-ES" dirty="0"/>
           </a:p>
@@ -5982,14 +6581,19 @@
             <p:ph idx="1"/>
           </p:nvPr>
         </p:nvSpPr>
-        <p:spPr/>
+        <p:spPr>
+          <a:xfrm>
+            <a:off x="457200" y="1484784"/>
+            <a:ext cx="8229600" cy="4970024"/>
+          </a:xfrm>
+        </p:spPr>
         <p:txBody>
           <a:bodyPr/>
           <a:lstStyle/>
           <a:p>
             <a:r>
               <a:rPr lang="es-AR" dirty="0" smtClean="0"/>
-              <a:t>Diagrama de clases resultante</a:t>
+              <a:t>Diagrama de despliegue : implementación ideal del sistema</a:t>
             </a:r>
             <a:endParaRPr lang="es-ES" dirty="0"/>
           </a:p>
@@ -5997,8 +6601,10 @@
       </p:sp>
       <p:pic>
         <p:nvPicPr>
-          <p:cNvPr id="4" name="3 Imagen"/>
-          <p:cNvPicPr/>
+          <p:cNvPr id="3074" name="Picture 2" descr="C:\Users\Usuario\Downloads\diagrama despliegue.JPG"/>
+          <p:cNvPicPr>
+            <a:picLocks noChangeAspect="1" noChangeArrowheads="1"/>
+          </p:cNvPicPr>
           <p:nvPr/>
         </p:nvPicPr>
         <p:blipFill>
@@ -6016,22 +6622,28 @@
         </p:blipFill>
         <p:spPr bwMode="auto">
           <a:xfrm>
-            <a:off x="1475656" y="2564904"/>
-            <a:ext cx="6048672" cy="3672408"/>
+            <a:off x="1403648" y="2708920"/>
+            <a:ext cx="6552728" cy="3703716"/>
           </a:xfrm>
           <a:prstGeom prst="rect">
             <a:avLst/>
           </a:prstGeom>
           <a:noFill/>
-          <a:ln>
-            <a:noFill/>
-          </a:ln>
+          <a:extLst>
+            <a:ext uri="{909E8E84-426E-40DD-AFC4-6F175D3DCCD1}">
+              <a14:hiddenFill xmlns:a14="http://schemas.microsoft.com/office/drawing/2010/main">
+                <a:solidFill>
+                  <a:srgbClr val="FFFFFF"/>
+                </a:solidFill>
+              </a14:hiddenFill>
+            </a:ext>
+          </a:extLst>
         </p:spPr>
       </p:pic>
     </p:spTree>
     <p:extLst>
       <p:ext uri="{BB962C8B-B14F-4D97-AF65-F5344CB8AC3E}">
-        <p14:creationId xmlns:p14="http://schemas.microsoft.com/office/powerpoint/2010/main" val="979921075"/>
+        <p14:creationId xmlns:p14="http://schemas.microsoft.com/office/powerpoint/2010/main" val="2775794953"/>
       </p:ext>
     </p:extLst>
   </p:cSld>
@@ -6075,7 +6687,7 @@
           <a:p>
             <a:r>
               <a:rPr lang="es-AR" dirty="0" smtClean="0"/>
-              <a:t>Diseño</a:t>
+              <a:t>Diseño	</a:t>
             </a:r>
             <a:endParaRPr lang="es-ES" dirty="0"/>
           </a:p>
@@ -6091,23 +6703,14 @@
             <p:ph idx="1"/>
           </p:nvPr>
         </p:nvSpPr>
-        <p:spPr>
-          <a:xfrm>
-            <a:off x="467544" y="1412776"/>
-            <a:ext cx="8229600" cy="5256584"/>
-          </a:xfrm>
-        </p:spPr>
+        <p:spPr/>
         <p:txBody>
           <a:bodyPr/>
           <a:lstStyle/>
           <a:p>
             <a:r>
               <a:rPr lang="es-AR" dirty="0" smtClean="0"/>
-              <a:t>Diagrama de componentes: </a:t>
-            </a:r>
-            <a:r>
-              <a:rPr lang="es-AR" dirty="0" smtClean="0"/>
-              <a:t>módulos identificados </a:t>
+              <a:t>Diagrama de clases resultante</a:t>
             </a:r>
             <a:endParaRPr lang="es-ES" dirty="0"/>
           </a:p>
@@ -6115,10 +6718,8 @@
       </p:sp>
       <p:pic>
         <p:nvPicPr>
-          <p:cNvPr id="4098" name="Picture 2" descr="C:\Users\Usuario\Downloads\diagrama componentes.JPG"/>
-          <p:cNvPicPr>
-            <a:picLocks noChangeAspect="1" noChangeArrowheads="1"/>
-          </p:cNvPicPr>
+          <p:cNvPr id="4" name="3 Imagen"/>
+          <p:cNvPicPr/>
           <p:nvPr/>
         </p:nvPicPr>
         <p:blipFill>
@@ -6136,28 +6737,22 @@
         </p:blipFill>
         <p:spPr bwMode="auto">
           <a:xfrm>
-            <a:off x="683568" y="2636912"/>
-            <a:ext cx="7920880" cy="3888432"/>
+            <a:off x="1475656" y="2564904"/>
+            <a:ext cx="6048672" cy="3672408"/>
           </a:xfrm>
           <a:prstGeom prst="rect">
             <a:avLst/>
           </a:prstGeom>
           <a:noFill/>
-          <a:extLst>
-            <a:ext uri="{909E8E84-426E-40DD-AFC4-6F175D3DCCD1}">
-              <a14:hiddenFill xmlns:a14="http://schemas.microsoft.com/office/drawing/2010/main">
-                <a:solidFill>
-                  <a:srgbClr val="FFFFFF"/>
-                </a:solidFill>
-              </a14:hiddenFill>
-            </a:ext>
-          </a:extLst>
+          <a:ln>
+            <a:noFill/>
+          </a:ln>
         </p:spPr>
       </p:pic>
     </p:spTree>
     <p:extLst>
       <p:ext uri="{BB962C8B-B14F-4D97-AF65-F5344CB8AC3E}">
-        <p14:creationId xmlns:p14="http://schemas.microsoft.com/office/powerpoint/2010/main" val="3508255810"/>
+        <p14:creationId xmlns:p14="http://schemas.microsoft.com/office/powerpoint/2010/main" val="979921075"/>
       </p:ext>
     </p:extLst>
   </p:cSld>

</xml_diff>